<commit_message>
Time vs. pattern length for each algorithm
</commit_message>
<xml_diff>
--- a/240FinalProjectGraphs.pptx
+++ b/240FinalProjectGraphs.pptx
@@ -10,10 +10,10 @@
     <p:sldId id="260" r:id="rId4"/>
     <p:sldId id="261" r:id="rId5"/>
     <p:sldId id="262" r:id="rId6"/>
-    <p:sldId id="264" r:id="rId7"/>
-    <p:sldId id="265" r:id="rId8"/>
-    <p:sldId id="258" r:id="rId9"/>
-    <p:sldId id="259" r:id="rId10"/>
+    <p:sldId id="258" r:id="rId7"/>
+    <p:sldId id="259" r:id="rId8"/>
+    <p:sldId id="264" r:id="rId9"/>
+    <p:sldId id="265" r:id="rId10"/>
   </p:sldIdLst>
   <p:sldSz cx="12192000" cy="6858000"/>
   <p:notesSz cx="6858000" cy="9144000"/>
@@ -112,6 +112,11 @@
       </a:defRPr>
     </a:lvl9pPr>
   </p:defaultTextStyle>
+  <p:extLst>
+    <p:ext uri="{EFAFB233-063F-42B5-8137-9DF3F51BA10A}">
+      <p15:sldGuideLst xmlns:p15="http://schemas.microsoft.com/office/powerpoint/2012/main"/>
+    </p:ext>
+  </p:extLst>
 </p:presentation>
 </file>
 
@@ -2277,7 +2282,7 @@
             </a:pPr>
             <a:r>
               <a:rPr lang="en-US"/>
-              <a:t>Boyer-Moore (No Match), Pattern Length 50</a:t>
+              <a:t>Boyer-Moore (Match), Text Length 100000</a:t>
             </a:r>
           </a:p>
         </c:rich>
@@ -2315,18 +2320,18 @@
     <c:plotArea>
       <c:layout/>
       <c:scatterChart>
-        <c:scatterStyle val="lineMarker"/>
+        <c:scatterStyle val="smoothMarker"/>
         <c:varyColors val="0"/>
         <c:ser>
           <c:idx val="0"/>
           <c:order val="0"/>
           <c:tx>
             <c:strRef>
-              <c:f>Sheet1!$K$1:$K$2</c:f>
+              <c:f>Sheet1!$J$8:$J$9</c:f>
               <c:strCache>
                 <c:ptCount val="2"/>
                 <c:pt idx="0">
-                  <c:v>Boyer-Moore (No Match), Pattern Length 50</c:v>
+                  <c:v>Boyer-Moore (Match), Text Length 100000</c:v>
                 </c:pt>
                 <c:pt idx="1">
                   <c:v>Time (µs)</c:v>
@@ -2336,7 +2341,9 @@
           </c:tx>
           <c:spPr>
             <a:ln w="19050" cap="rnd">
-              <a:noFill/>
+              <a:solidFill>
+                <a:schemeClr val="accent1"/>
+              </a:solidFill>
               <a:round/>
             </a:ln>
             <a:effectLst/>
@@ -2356,103 +2363,52 @@
               <a:effectLst/>
             </c:spPr>
           </c:marker>
-          <c:trendline>
-            <c:spPr>
-              <a:ln w="19050" cap="rnd">
-                <a:solidFill>
-                  <a:schemeClr val="accent1"/>
-                </a:solidFill>
-                <a:prstDash val="sysDot"/>
-              </a:ln>
-              <a:effectLst/>
-            </c:spPr>
-            <c:trendlineType val="linear"/>
-            <c:intercept val="0"/>
-            <c:dispRSqr val="0"/>
-            <c:dispEq val="1"/>
-            <c:trendlineLbl>
-              <c:layout>
-                <c:manualLayout>
-                  <c:x val="0.10324229002624671"/>
-                  <c:y val="-0.12786191309419656"/>
-                </c:manualLayout>
-              </c:layout>
-              <c:numFmt formatCode="General" sourceLinked="0"/>
-              <c:spPr>
-                <a:noFill/>
-                <a:ln>
-                  <a:noFill/>
-                </a:ln>
-                <a:effectLst/>
-              </c:spPr>
-              <c:txPr>
-                <a:bodyPr rot="0" spcFirstLastPara="1" vertOverflow="ellipsis" vert="horz" wrap="square" anchor="ctr" anchorCtr="1"/>
-                <a:lstStyle/>
-                <a:p>
-                  <a:pPr>
-                    <a:defRPr sz="900" b="0" i="0" u="none" strike="noStrike" kern="1200" baseline="0">
-                      <a:solidFill>
-                        <a:schemeClr val="tx1">
-                          <a:lumMod val="65000"/>
-                          <a:lumOff val="35000"/>
-                        </a:schemeClr>
-                      </a:solidFill>
-                      <a:latin typeface="+mn-lt"/>
-                      <a:ea typeface="+mn-ea"/>
-                      <a:cs typeface="+mn-cs"/>
-                    </a:defRPr>
-                  </a:pPr>
-                  <a:endParaRPr lang="en-US"/>
-                </a:p>
-              </c:txPr>
-            </c:trendlineLbl>
-          </c:trendline>
           <c:xVal>
             <c:numRef>
-              <c:f>Sheet1!$J$3:$J$6</c:f>
+              <c:f>Sheet1!$I$10:$I$13</c:f>
               <c:numCache>
                 <c:formatCode>General</c:formatCode>
                 <c:ptCount val="4"/>
                 <c:pt idx="0">
-                  <c:v>100</c:v>
+                  <c:v>5</c:v>
                 </c:pt>
                 <c:pt idx="1">
-                  <c:v>1000</c:v>
+                  <c:v>50</c:v>
                 </c:pt>
                 <c:pt idx="2">
-                  <c:v>10000</c:v>
+                  <c:v>500</c:v>
                 </c:pt>
                 <c:pt idx="3">
-                  <c:v>100000</c:v>
+                  <c:v>5000</c:v>
                 </c:pt>
               </c:numCache>
             </c:numRef>
           </c:xVal>
           <c:yVal>
             <c:numRef>
-              <c:f>Sheet1!$K$3:$K$6</c:f>
+              <c:f>Sheet1!$J$10:$J$13</c:f>
               <c:numCache>
                 <c:formatCode>General</c:formatCode>
                 <c:ptCount val="4"/>
                 <c:pt idx="0">
-                  <c:v>0</c:v>
+                  <c:v>2626</c:v>
                 </c:pt>
                 <c:pt idx="1">
-                  <c:v>13</c:v>
+                  <c:v>643</c:v>
                 </c:pt>
                 <c:pt idx="2">
-                  <c:v>142</c:v>
+                  <c:v>81</c:v>
                 </c:pt>
                 <c:pt idx="3">
-                  <c:v>1387</c:v>
+                  <c:v>84</c:v>
                 </c:pt>
               </c:numCache>
             </c:numRef>
           </c:yVal>
-          <c:smooth val="0"/>
+          <c:smooth val="1"/>
           <c:extLst>
             <c:ext xmlns:c16="http://schemas.microsoft.com/office/drawing/2014/chart" uri="{C3380CC4-5D6E-409C-BE32-E72D297353CC}">
-              <c16:uniqueId val="{00000001-6197-4832-AC56-CB06929D36B0}"/>
+              <c16:uniqueId val="{00000000-F4E9-46FC-AB04-2A2CB918A62A}"/>
             </c:ext>
           </c:extLst>
         </c:ser>
@@ -2464,13 +2420,14 @@
           <c:showPercent val="0"/>
           <c:showBubbleSize val="0"/>
         </c:dLbls>
-        <c:axId val="1355085248"/>
-        <c:axId val="1357132384"/>
+        <c:axId val="1147890944"/>
+        <c:axId val="1357270912"/>
       </c:scatterChart>
       <c:valAx>
-        <c:axId val="1355085248"/>
+        <c:axId val="1147890944"/>
         <c:scaling>
           <c:orientation val="minMax"/>
+          <c:min val="0"/>
         </c:scaling>
         <c:delete val="0"/>
         <c:axPos val="b"/>
@@ -2509,8 +2466,13 @@
                 </a:pPr>
                 <a:r>
                   <a:rPr lang="en-US"/>
-                  <a:t>Text Length</a:t>
+                  <a:t>Pattern</a:t>
                 </a:r>
+                <a:r>
+                  <a:rPr lang="en-US" baseline="0"/>
+                  <a:t> Length</a:t>
+                </a:r>
+                <a:endParaRPr lang="en-US"/>
               </a:p>
             </c:rich>
           </c:tx>
@@ -2580,12 +2542,12 @@
             <a:endParaRPr lang="en-US"/>
           </a:p>
         </c:txPr>
-        <c:crossAx val="1357132384"/>
+        <c:crossAx val="1357270912"/>
         <c:crosses val="autoZero"/>
         <c:crossBetween val="midCat"/>
       </c:valAx>
       <c:valAx>
-        <c:axId val="1357132384"/>
+        <c:axId val="1357270912"/>
         <c:scaling>
           <c:orientation val="minMax"/>
         </c:scaling>
@@ -2704,7 +2666,7 @@
             <a:endParaRPr lang="en-US"/>
           </a:p>
         </c:txPr>
-        <c:crossAx val="1355085248"/>
+        <c:crossAx val="1147890944"/>
         <c:crosses val="autoZero"/>
         <c:crossBetween val="midCat"/>
       </c:valAx>
@@ -2751,6 +2713,920 @@
 </file>
 
 <file path=ppt/charts/chart6.xml><?xml version="1.0" encoding="utf-8"?>
+<c:chartSpace xmlns:c="http://schemas.openxmlformats.org/drawingml/2006/chart" xmlns:a="http://schemas.openxmlformats.org/drawingml/2006/main" xmlns:r="http://schemas.openxmlformats.org/officeDocument/2006/relationships" xmlns:c16r2="http://schemas.microsoft.com/office/drawing/2015/06/chart">
+  <c:date1904 val="0"/>
+  <c:lang val="en-US"/>
+  <c:roundedCorners val="0"/>
+  <mc:AlternateContent xmlns:mc="http://schemas.openxmlformats.org/markup-compatibility/2006">
+    <mc:Choice xmlns:c14="http://schemas.microsoft.com/office/drawing/2007/8/2/chart" Requires="c14">
+      <c14:style val="102"/>
+    </mc:Choice>
+    <mc:Fallback>
+      <c:style val="2"/>
+    </mc:Fallback>
+  </mc:AlternateContent>
+  <c:chart>
+    <c:title>
+      <c:tx>
+        <c:rich>
+          <a:bodyPr rot="0" spcFirstLastPara="1" vertOverflow="ellipsis" vert="horz" wrap="square" anchor="ctr" anchorCtr="1"/>
+          <a:lstStyle/>
+          <a:p>
+            <a:pPr>
+              <a:defRPr sz="1400" b="0" i="0" u="none" strike="noStrike" kern="1200" spc="0" baseline="0">
+                <a:solidFill>
+                  <a:schemeClr val="tx1">
+                    <a:lumMod val="65000"/>
+                    <a:lumOff val="35000"/>
+                  </a:schemeClr>
+                </a:solidFill>
+                <a:latin typeface="+mn-lt"/>
+                <a:ea typeface="+mn-ea"/>
+                <a:cs typeface="+mn-cs"/>
+              </a:defRPr>
+            </a:pPr>
+            <a:r>
+              <a:rPr lang="en-US"/>
+              <a:t>KMP (No Match), Size 50 Pattern</a:t>
+            </a:r>
+          </a:p>
+        </c:rich>
+      </c:tx>
+      <c:overlay val="0"/>
+      <c:spPr>
+        <a:noFill/>
+        <a:ln>
+          <a:noFill/>
+        </a:ln>
+        <a:effectLst/>
+      </c:spPr>
+      <c:txPr>
+        <a:bodyPr rot="0" spcFirstLastPara="1" vertOverflow="ellipsis" vert="horz" wrap="square" anchor="ctr" anchorCtr="1"/>
+        <a:lstStyle/>
+        <a:p>
+          <a:pPr>
+            <a:defRPr sz="1400" b="0" i="0" u="none" strike="noStrike" kern="1200" spc="0" baseline="0">
+              <a:solidFill>
+                <a:schemeClr val="tx1">
+                  <a:lumMod val="65000"/>
+                  <a:lumOff val="35000"/>
+                </a:schemeClr>
+              </a:solidFill>
+              <a:latin typeface="+mn-lt"/>
+              <a:ea typeface="+mn-ea"/>
+              <a:cs typeface="+mn-cs"/>
+            </a:defRPr>
+          </a:pPr>
+          <a:endParaRPr lang="en-US"/>
+        </a:p>
+      </c:txPr>
+    </c:title>
+    <c:autoTitleDeleted val="0"/>
+    <c:plotArea>
+      <c:layout/>
+      <c:scatterChart>
+        <c:scatterStyle val="lineMarker"/>
+        <c:varyColors val="0"/>
+        <c:ser>
+          <c:idx val="0"/>
+          <c:order val="0"/>
+          <c:tx>
+            <c:strRef>
+              <c:f>Sheet1!$E$16:$E$17</c:f>
+              <c:strCache>
+                <c:ptCount val="2"/>
+                <c:pt idx="0">
+                  <c:v>KMP (No Match), Size 50 Pattern</c:v>
+                </c:pt>
+                <c:pt idx="1">
+                  <c:v>Time (µs)</c:v>
+                </c:pt>
+              </c:strCache>
+            </c:strRef>
+          </c:tx>
+          <c:spPr>
+            <a:ln w="19050" cap="rnd">
+              <a:noFill/>
+              <a:round/>
+            </a:ln>
+            <a:effectLst/>
+          </c:spPr>
+          <c:marker>
+            <c:symbol val="circle"/>
+            <c:size val="5"/>
+            <c:spPr>
+              <a:solidFill>
+                <a:schemeClr val="accent1"/>
+              </a:solidFill>
+              <a:ln w="9525">
+                <a:solidFill>
+                  <a:schemeClr val="accent1"/>
+                </a:solidFill>
+              </a:ln>
+              <a:effectLst/>
+            </c:spPr>
+          </c:marker>
+          <c:xVal>
+            <c:numRef>
+              <c:f>Sheet1!$D$18:$D$21</c:f>
+              <c:numCache>
+                <c:formatCode>General</c:formatCode>
+                <c:ptCount val="4"/>
+                <c:pt idx="0">
+                  <c:v>100</c:v>
+                </c:pt>
+                <c:pt idx="1">
+                  <c:v>1000</c:v>
+                </c:pt>
+                <c:pt idx="2">
+                  <c:v>10000</c:v>
+                </c:pt>
+                <c:pt idx="3">
+                  <c:v>100000</c:v>
+                </c:pt>
+              </c:numCache>
+            </c:numRef>
+          </c:xVal>
+          <c:yVal>
+            <c:numRef>
+              <c:f>Sheet1!$E$18:$E$21</c:f>
+              <c:numCache>
+                <c:formatCode>General</c:formatCode>
+                <c:ptCount val="4"/>
+                <c:pt idx="0">
+                  <c:v>0</c:v>
+                </c:pt>
+                <c:pt idx="1">
+                  <c:v>0</c:v>
+                </c:pt>
+                <c:pt idx="2">
+                  <c:v>0</c:v>
+                </c:pt>
+                <c:pt idx="3">
+                  <c:v>1</c:v>
+                </c:pt>
+              </c:numCache>
+            </c:numRef>
+          </c:yVal>
+          <c:smooth val="0"/>
+          <c:extLst>
+            <c:ext xmlns:c16="http://schemas.microsoft.com/office/drawing/2014/chart" uri="{C3380CC4-5D6E-409C-BE32-E72D297353CC}">
+              <c16:uniqueId val="{00000000-E8EA-41BE-82E8-B2392567F7D1}"/>
+            </c:ext>
+          </c:extLst>
+        </c:ser>
+        <c:dLbls>
+          <c:showLegendKey val="0"/>
+          <c:showVal val="0"/>
+          <c:showCatName val="0"/>
+          <c:showSerName val="0"/>
+          <c:showPercent val="0"/>
+          <c:showBubbleSize val="0"/>
+        </c:dLbls>
+        <c:axId val="1426002496"/>
+        <c:axId val="1432452384"/>
+      </c:scatterChart>
+      <c:valAx>
+        <c:axId val="1426002496"/>
+        <c:scaling>
+          <c:orientation val="minMax"/>
+        </c:scaling>
+        <c:delete val="0"/>
+        <c:axPos val="b"/>
+        <c:majorGridlines>
+          <c:spPr>
+            <a:ln w="9525" cap="flat" cmpd="sng" algn="ctr">
+              <a:solidFill>
+                <a:schemeClr val="tx1">
+                  <a:lumMod val="15000"/>
+                  <a:lumOff val="85000"/>
+                </a:schemeClr>
+              </a:solidFill>
+              <a:round/>
+            </a:ln>
+            <a:effectLst/>
+          </c:spPr>
+        </c:majorGridlines>
+        <c:title>
+          <c:tx>
+            <c:rich>
+              <a:bodyPr rot="0" spcFirstLastPara="1" vertOverflow="ellipsis" vert="horz" wrap="square" anchor="ctr" anchorCtr="1"/>
+              <a:lstStyle/>
+              <a:p>
+                <a:pPr>
+                  <a:defRPr sz="1000" b="0" i="0" u="none" strike="noStrike" kern="1200" baseline="0">
+                    <a:solidFill>
+                      <a:schemeClr val="tx1">
+                        <a:lumMod val="65000"/>
+                        <a:lumOff val="35000"/>
+                      </a:schemeClr>
+                    </a:solidFill>
+                    <a:latin typeface="+mn-lt"/>
+                    <a:ea typeface="+mn-ea"/>
+                    <a:cs typeface="+mn-cs"/>
+                  </a:defRPr>
+                </a:pPr>
+                <a:r>
+                  <a:rPr lang="en-US"/>
+                  <a:t>Text Length</a:t>
+                </a:r>
+              </a:p>
+            </c:rich>
+          </c:tx>
+          <c:overlay val="0"/>
+          <c:spPr>
+            <a:noFill/>
+            <a:ln>
+              <a:noFill/>
+            </a:ln>
+            <a:effectLst/>
+          </c:spPr>
+          <c:txPr>
+            <a:bodyPr rot="0" spcFirstLastPara="1" vertOverflow="ellipsis" vert="horz" wrap="square" anchor="ctr" anchorCtr="1"/>
+            <a:lstStyle/>
+            <a:p>
+              <a:pPr>
+                <a:defRPr sz="1000" b="0" i="0" u="none" strike="noStrike" kern="1200" baseline="0">
+                  <a:solidFill>
+                    <a:schemeClr val="tx1">
+                      <a:lumMod val="65000"/>
+                      <a:lumOff val="35000"/>
+                    </a:schemeClr>
+                  </a:solidFill>
+                  <a:latin typeface="+mn-lt"/>
+                  <a:ea typeface="+mn-ea"/>
+                  <a:cs typeface="+mn-cs"/>
+                </a:defRPr>
+              </a:pPr>
+              <a:endParaRPr lang="en-US"/>
+            </a:p>
+          </c:txPr>
+        </c:title>
+        <c:numFmt formatCode="General" sourceLinked="1"/>
+        <c:majorTickMark val="none"/>
+        <c:minorTickMark val="none"/>
+        <c:tickLblPos val="nextTo"/>
+        <c:spPr>
+          <a:noFill/>
+          <a:ln w="9525" cap="flat" cmpd="sng" algn="ctr">
+            <a:solidFill>
+              <a:schemeClr val="tx1">
+                <a:lumMod val="25000"/>
+                <a:lumOff val="75000"/>
+              </a:schemeClr>
+            </a:solidFill>
+            <a:round/>
+          </a:ln>
+          <a:effectLst/>
+        </c:spPr>
+        <c:txPr>
+          <a:bodyPr rot="-60000000" spcFirstLastPara="1" vertOverflow="ellipsis" vert="horz" wrap="square" anchor="ctr" anchorCtr="1"/>
+          <a:lstStyle/>
+          <a:p>
+            <a:pPr>
+              <a:defRPr sz="900" b="0" i="0" u="none" strike="noStrike" kern="1200" baseline="0">
+                <a:solidFill>
+                  <a:schemeClr val="tx1">
+                    <a:lumMod val="65000"/>
+                    <a:lumOff val="35000"/>
+                  </a:schemeClr>
+                </a:solidFill>
+                <a:latin typeface="+mn-lt"/>
+                <a:ea typeface="+mn-ea"/>
+                <a:cs typeface="+mn-cs"/>
+              </a:defRPr>
+            </a:pPr>
+            <a:endParaRPr lang="en-US"/>
+          </a:p>
+        </c:txPr>
+        <c:crossAx val="1432452384"/>
+        <c:crosses val="autoZero"/>
+        <c:crossBetween val="midCat"/>
+      </c:valAx>
+      <c:valAx>
+        <c:axId val="1432452384"/>
+        <c:scaling>
+          <c:orientation val="minMax"/>
+        </c:scaling>
+        <c:delete val="0"/>
+        <c:axPos val="l"/>
+        <c:majorGridlines>
+          <c:spPr>
+            <a:ln w="9525" cap="flat" cmpd="sng" algn="ctr">
+              <a:solidFill>
+                <a:schemeClr val="tx1">
+                  <a:lumMod val="15000"/>
+                  <a:lumOff val="85000"/>
+                </a:schemeClr>
+              </a:solidFill>
+              <a:round/>
+            </a:ln>
+            <a:effectLst/>
+          </c:spPr>
+        </c:majorGridlines>
+        <c:title>
+          <c:tx>
+            <c:rich>
+              <a:bodyPr rot="-5400000" spcFirstLastPara="1" vertOverflow="ellipsis" vert="horz" wrap="square" anchor="ctr" anchorCtr="1"/>
+              <a:lstStyle/>
+              <a:p>
+                <a:pPr>
+                  <a:defRPr sz="1000" b="0" i="0" u="none" strike="noStrike" kern="1200" baseline="0">
+                    <a:solidFill>
+                      <a:schemeClr val="tx1">
+                        <a:lumMod val="65000"/>
+                        <a:lumOff val="35000"/>
+                      </a:schemeClr>
+                    </a:solidFill>
+                    <a:latin typeface="+mn-lt"/>
+                    <a:ea typeface="+mn-ea"/>
+                    <a:cs typeface="+mn-cs"/>
+                  </a:defRPr>
+                </a:pPr>
+                <a:r>
+                  <a:rPr lang="en-US" sz="1000" b="0" i="0" u="none" strike="noStrike" baseline="0">
+                    <a:effectLst/>
+                  </a:rPr>
+                  <a:t>Time (µs)</a:t>
+                </a:r>
+                <a:r>
+                  <a:rPr lang="en-US" sz="1000" b="0" i="0" u="none" strike="noStrike" baseline="0"/>
+                  <a:t> </a:t>
+                </a:r>
+                <a:endParaRPr lang="en-US"/>
+              </a:p>
+            </c:rich>
+          </c:tx>
+          <c:overlay val="0"/>
+          <c:spPr>
+            <a:noFill/>
+            <a:ln>
+              <a:noFill/>
+            </a:ln>
+            <a:effectLst/>
+          </c:spPr>
+          <c:txPr>
+            <a:bodyPr rot="-5400000" spcFirstLastPara="1" vertOverflow="ellipsis" vert="horz" wrap="square" anchor="ctr" anchorCtr="1"/>
+            <a:lstStyle/>
+            <a:p>
+              <a:pPr>
+                <a:defRPr sz="1000" b="0" i="0" u="none" strike="noStrike" kern="1200" baseline="0">
+                  <a:solidFill>
+                    <a:schemeClr val="tx1">
+                      <a:lumMod val="65000"/>
+                      <a:lumOff val="35000"/>
+                    </a:schemeClr>
+                  </a:solidFill>
+                  <a:latin typeface="+mn-lt"/>
+                  <a:ea typeface="+mn-ea"/>
+                  <a:cs typeface="+mn-cs"/>
+                </a:defRPr>
+              </a:pPr>
+              <a:endParaRPr lang="en-US"/>
+            </a:p>
+          </c:txPr>
+        </c:title>
+        <c:numFmt formatCode="General" sourceLinked="1"/>
+        <c:majorTickMark val="none"/>
+        <c:minorTickMark val="none"/>
+        <c:tickLblPos val="nextTo"/>
+        <c:spPr>
+          <a:noFill/>
+          <a:ln w="9525" cap="flat" cmpd="sng" algn="ctr">
+            <a:solidFill>
+              <a:schemeClr val="tx1">
+                <a:lumMod val="25000"/>
+                <a:lumOff val="75000"/>
+              </a:schemeClr>
+            </a:solidFill>
+            <a:round/>
+          </a:ln>
+          <a:effectLst/>
+        </c:spPr>
+        <c:txPr>
+          <a:bodyPr rot="-60000000" spcFirstLastPara="1" vertOverflow="ellipsis" vert="horz" wrap="square" anchor="ctr" anchorCtr="1"/>
+          <a:lstStyle/>
+          <a:p>
+            <a:pPr>
+              <a:defRPr sz="900" b="0" i="0" u="none" strike="noStrike" kern="1200" baseline="0">
+                <a:solidFill>
+                  <a:schemeClr val="tx1">
+                    <a:lumMod val="65000"/>
+                    <a:lumOff val="35000"/>
+                  </a:schemeClr>
+                </a:solidFill>
+                <a:latin typeface="+mn-lt"/>
+                <a:ea typeface="+mn-ea"/>
+                <a:cs typeface="+mn-cs"/>
+              </a:defRPr>
+            </a:pPr>
+            <a:endParaRPr lang="en-US"/>
+          </a:p>
+        </c:txPr>
+        <c:crossAx val="1426002496"/>
+        <c:crosses val="autoZero"/>
+        <c:crossBetween val="midCat"/>
+      </c:valAx>
+      <c:spPr>
+        <a:noFill/>
+        <a:ln>
+          <a:noFill/>
+        </a:ln>
+        <a:effectLst/>
+      </c:spPr>
+    </c:plotArea>
+    <c:plotVisOnly val="1"/>
+    <c:dispBlanksAs val="gap"/>
+    <c:extLst>
+      <c:ext xmlns:c16r3="http://schemas.microsoft.com/office/drawing/2017/03/chart" uri="{56B9EC1D-385E-4148-901F-78D8002777C0}">
+        <c16r3:dataDisplayOptions16>
+          <c16r3:dispNaAsBlank val="1"/>
+        </c16r3:dataDisplayOptions16>
+      </c:ext>
+    </c:extLst>
+    <c:showDLblsOverMax val="0"/>
+  </c:chart>
+  <c:spPr>
+    <a:noFill/>
+    <a:ln>
+      <a:noFill/>
+    </a:ln>
+    <a:effectLst/>
+  </c:spPr>
+  <c:txPr>
+    <a:bodyPr/>
+    <a:lstStyle/>
+    <a:p>
+      <a:pPr>
+        <a:defRPr/>
+      </a:pPr>
+      <a:endParaRPr lang="en-US"/>
+    </a:p>
+  </c:txPr>
+  <c:externalData r:id="rId3">
+    <c:autoUpdate val="0"/>
+  </c:externalData>
+</c:chartSpace>
+</file>
+
+<file path=ppt/charts/chart7.xml><?xml version="1.0" encoding="utf-8"?>
+<c:chartSpace xmlns:c="http://schemas.openxmlformats.org/drawingml/2006/chart" xmlns:a="http://schemas.openxmlformats.org/drawingml/2006/main" xmlns:r="http://schemas.openxmlformats.org/officeDocument/2006/relationships" xmlns:c16r2="http://schemas.microsoft.com/office/drawing/2015/06/chart">
+  <c:date1904 val="0"/>
+  <c:lang val="en-US"/>
+  <c:roundedCorners val="0"/>
+  <mc:AlternateContent xmlns:mc="http://schemas.openxmlformats.org/markup-compatibility/2006">
+    <mc:Choice xmlns:c14="http://schemas.microsoft.com/office/drawing/2007/8/2/chart" Requires="c14">
+      <c14:style val="102"/>
+    </mc:Choice>
+    <mc:Fallback>
+      <c:style val="2"/>
+    </mc:Fallback>
+  </mc:AlternateContent>
+  <c:chart>
+    <c:title>
+      <c:tx>
+        <c:rich>
+          <a:bodyPr rot="0" spcFirstLastPara="1" vertOverflow="ellipsis" vert="horz" wrap="square" anchor="ctr" anchorCtr="1"/>
+          <a:lstStyle/>
+          <a:p>
+            <a:pPr>
+              <a:defRPr sz="1400" b="0" i="0" u="none" strike="noStrike" kern="1200" spc="0" baseline="0">
+                <a:solidFill>
+                  <a:schemeClr val="tx1">
+                    <a:lumMod val="65000"/>
+                    <a:lumOff val="35000"/>
+                  </a:schemeClr>
+                </a:solidFill>
+                <a:latin typeface="+mn-lt"/>
+                <a:ea typeface="+mn-ea"/>
+                <a:cs typeface="+mn-cs"/>
+              </a:defRPr>
+            </a:pPr>
+            <a:r>
+              <a:rPr lang="en-US"/>
+              <a:t>KMP (Match), Size 50 Pattern</a:t>
+            </a:r>
+          </a:p>
+        </c:rich>
+      </c:tx>
+      <c:overlay val="0"/>
+      <c:spPr>
+        <a:noFill/>
+        <a:ln>
+          <a:noFill/>
+        </a:ln>
+        <a:effectLst/>
+      </c:spPr>
+      <c:txPr>
+        <a:bodyPr rot="0" spcFirstLastPara="1" vertOverflow="ellipsis" vert="horz" wrap="square" anchor="ctr" anchorCtr="1"/>
+        <a:lstStyle/>
+        <a:p>
+          <a:pPr>
+            <a:defRPr sz="1400" b="0" i="0" u="none" strike="noStrike" kern="1200" spc="0" baseline="0">
+              <a:solidFill>
+                <a:schemeClr val="tx1">
+                  <a:lumMod val="65000"/>
+                  <a:lumOff val="35000"/>
+                </a:schemeClr>
+              </a:solidFill>
+              <a:latin typeface="+mn-lt"/>
+              <a:ea typeface="+mn-ea"/>
+              <a:cs typeface="+mn-cs"/>
+            </a:defRPr>
+          </a:pPr>
+          <a:endParaRPr lang="en-US"/>
+        </a:p>
+      </c:txPr>
+    </c:title>
+    <c:autoTitleDeleted val="0"/>
+    <c:plotArea>
+      <c:layout/>
+      <c:scatterChart>
+        <c:scatterStyle val="lineMarker"/>
+        <c:varyColors val="0"/>
+        <c:ser>
+          <c:idx val="0"/>
+          <c:order val="0"/>
+          <c:tx>
+            <c:strRef>
+              <c:f>Sheet1!$B$16:$B$17</c:f>
+              <c:strCache>
+                <c:ptCount val="2"/>
+                <c:pt idx="0">
+                  <c:v>KMP (Match), Size 50 Pattern</c:v>
+                </c:pt>
+                <c:pt idx="1">
+                  <c:v>Time (µs)</c:v>
+                </c:pt>
+              </c:strCache>
+            </c:strRef>
+          </c:tx>
+          <c:spPr>
+            <a:ln w="19050" cap="rnd">
+              <a:noFill/>
+              <a:round/>
+            </a:ln>
+            <a:effectLst/>
+          </c:spPr>
+          <c:marker>
+            <c:symbol val="circle"/>
+            <c:size val="5"/>
+            <c:spPr>
+              <a:solidFill>
+                <a:schemeClr val="accent1"/>
+              </a:solidFill>
+              <a:ln w="9525">
+                <a:solidFill>
+                  <a:schemeClr val="accent1"/>
+                </a:solidFill>
+              </a:ln>
+              <a:effectLst/>
+            </c:spPr>
+          </c:marker>
+          <c:xVal>
+            <c:numRef>
+              <c:f>Sheet1!$A$18:$A$21</c:f>
+              <c:numCache>
+                <c:formatCode>General</c:formatCode>
+                <c:ptCount val="4"/>
+                <c:pt idx="0">
+                  <c:v>100</c:v>
+                </c:pt>
+                <c:pt idx="1">
+                  <c:v>1000</c:v>
+                </c:pt>
+                <c:pt idx="2">
+                  <c:v>10000</c:v>
+                </c:pt>
+                <c:pt idx="3">
+                  <c:v>100000</c:v>
+                </c:pt>
+              </c:numCache>
+            </c:numRef>
+          </c:xVal>
+          <c:yVal>
+            <c:numRef>
+              <c:f>Sheet1!$B$18:$B$21</c:f>
+              <c:numCache>
+                <c:formatCode>General</c:formatCode>
+                <c:ptCount val="4"/>
+                <c:pt idx="0">
+                  <c:v>0</c:v>
+                </c:pt>
+                <c:pt idx="1">
+                  <c:v>0</c:v>
+                </c:pt>
+                <c:pt idx="2">
+                  <c:v>0</c:v>
+                </c:pt>
+                <c:pt idx="3">
+                  <c:v>1</c:v>
+                </c:pt>
+              </c:numCache>
+            </c:numRef>
+          </c:yVal>
+          <c:smooth val="0"/>
+          <c:extLst>
+            <c:ext xmlns:c16="http://schemas.microsoft.com/office/drawing/2014/chart" uri="{C3380CC4-5D6E-409C-BE32-E72D297353CC}">
+              <c16:uniqueId val="{00000000-113C-481D-8392-406AB32FB1C0}"/>
+            </c:ext>
+          </c:extLst>
+        </c:ser>
+        <c:dLbls>
+          <c:showLegendKey val="0"/>
+          <c:showVal val="0"/>
+          <c:showCatName val="0"/>
+          <c:showSerName val="0"/>
+          <c:showPercent val="0"/>
+          <c:showBubbleSize val="0"/>
+        </c:dLbls>
+        <c:axId val="1007570592"/>
+        <c:axId val="1432458208"/>
+      </c:scatterChart>
+      <c:valAx>
+        <c:axId val="1007570592"/>
+        <c:scaling>
+          <c:orientation val="minMax"/>
+        </c:scaling>
+        <c:delete val="0"/>
+        <c:axPos val="b"/>
+        <c:majorGridlines>
+          <c:spPr>
+            <a:ln w="9525" cap="flat" cmpd="sng" algn="ctr">
+              <a:solidFill>
+                <a:schemeClr val="tx1">
+                  <a:lumMod val="15000"/>
+                  <a:lumOff val="85000"/>
+                </a:schemeClr>
+              </a:solidFill>
+              <a:round/>
+            </a:ln>
+            <a:effectLst/>
+          </c:spPr>
+        </c:majorGridlines>
+        <c:title>
+          <c:tx>
+            <c:rich>
+              <a:bodyPr rot="0" spcFirstLastPara="1" vertOverflow="ellipsis" vert="horz" wrap="square" anchor="ctr" anchorCtr="1"/>
+              <a:lstStyle/>
+              <a:p>
+                <a:pPr>
+                  <a:defRPr sz="1000" b="0" i="0" u="none" strike="noStrike" kern="1200" baseline="0">
+                    <a:solidFill>
+                      <a:schemeClr val="tx1">
+                        <a:lumMod val="65000"/>
+                        <a:lumOff val="35000"/>
+                      </a:schemeClr>
+                    </a:solidFill>
+                    <a:latin typeface="+mn-lt"/>
+                    <a:ea typeface="+mn-ea"/>
+                    <a:cs typeface="+mn-cs"/>
+                  </a:defRPr>
+                </a:pPr>
+                <a:r>
+                  <a:rPr lang="en-US"/>
+                  <a:t>Text Length</a:t>
+                </a:r>
+              </a:p>
+            </c:rich>
+          </c:tx>
+          <c:overlay val="0"/>
+          <c:spPr>
+            <a:noFill/>
+            <a:ln>
+              <a:noFill/>
+            </a:ln>
+            <a:effectLst/>
+          </c:spPr>
+          <c:txPr>
+            <a:bodyPr rot="0" spcFirstLastPara="1" vertOverflow="ellipsis" vert="horz" wrap="square" anchor="ctr" anchorCtr="1"/>
+            <a:lstStyle/>
+            <a:p>
+              <a:pPr>
+                <a:defRPr sz="1000" b="0" i="0" u="none" strike="noStrike" kern="1200" baseline="0">
+                  <a:solidFill>
+                    <a:schemeClr val="tx1">
+                      <a:lumMod val="65000"/>
+                      <a:lumOff val="35000"/>
+                    </a:schemeClr>
+                  </a:solidFill>
+                  <a:latin typeface="+mn-lt"/>
+                  <a:ea typeface="+mn-ea"/>
+                  <a:cs typeface="+mn-cs"/>
+                </a:defRPr>
+              </a:pPr>
+              <a:endParaRPr lang="en-US"/>
+            </a:p>
+          </c:txPr>
+        </c:title>
+        <c:numFmt formatCode="General" sourceLinked="1"/>
+        <c:majorTickMark val="none"/>
+        <c:minorTickMark val="none"/>
+        <c:tickLblPos val="nextTo"/>
+        <c:spPr>
+          <a:noFill/>
+          <a:ln w="9525" cap="flat" cmpd="sng" algn="ctr">
+            <a:solidFill>
+              <a:schemeClr val="tx1">
+                <a:lumMod val="25000"/>
+                <a:lumOff val="75000"/>
+              </a:schemeClr>
+            </a:solidFill>
+            <a:round/>
+          </a:ln>
+          <a:effectLst/>
+        </c:spPr>
+        <c:txPr>
+          <a:bodyPr rot="-60000000" spcFirstLastPara="1" vertOverflow="ellipsis" vert="horz" wrap="square" anchor="ctr" anchorCtr="1"/>
+          <a:lstStyle/>
+          <a:p>
+            <a:pPr>
+              <a:defRPr sz="900" b="0" i="0" u="none" strike="noStrike" kern="1200" baseline="0">
+                <a:solidFill>
+                  <a:schemeClr val="tx1">
+                    <a:lumMod val="65000"/>
+                    <a:lumOff val="35000"/>
+                  </a:schemeClr>
+                </a:solidFill>
+                <a:latin typeface="+mn-lt"/>
+                <a:ea typeface="+mn-ea"/>
+                <a:cs typeface="+mn-cs"/>
+              </a:defRPr>
+            </a:pPr>
+            <a:endParaRPr lang="en-US"/>
+          </a:p>
+        </c:txPr>
+        <c:crossAx val="1432458208"/>
+        <c:crosses val="autoZero"/>
+        <c:crossBetween val="midCat"/>
+      </c:valAx>
+      <c:valAx>
+        <c:axId val="1432458208"/>
+        <c:scaling>
+          <c:orientation val="minMax"/>
+        </c:scaling>
+        <c:delete val="0"/>
+        <c:axPos val="l"/>
+        <c:majorGridlines>
+          <c:spPr>
+            <a:ln w="9525" cap="flat" cmpd="sng" algn="ctr">
+              <a:solidFill>
+                <a:schemeClr val="tx1">
+                  <a:lumMod val="15000"/>
+                  <a:lumOff val="85000"/>
+                </a:schemeClr>
+              </a:solidFill>
+              <a:round/>
+            </a:ln>
+            <a:effectLst/>
+          </c:spPr>
+        </c:majorGridlines>
+        <c:title>
+          <c:tx>
+            <c:rich>
+              <a:bodyPr rot="-5400000" spcFirstLastPara="1" vertOverflow="ellipsis" vert="horz" wrap="square" anchor="ctr" anchorCtr="1"/>
+              <a:lstStyle/>
+              <a:p>
+                <a:pPr>
+                  <a:defRPr sz="1000" b="0" i="0" u="none" strike="noStrike" kern="1200" baseline="0">
+                    <a:solidFill>
+                      <a:schemeClr val="tx1">
+                        <a:lumMod val="65000"/>
+                        <a:lumOff val="35000"/>
+                      </a:schemeClr>
+                    </a:solidFill>
+                    <a:latin typeface="+mn-lt"/>
+                    <a:ea typeface="+mn-ea"/>
+                    <a:cs typeface="+mn-cs"/>
+                  </a:defRPr>
+                </a:pPr>
+                <a:r>
+                  <a:rPr lang="en-US" sz="1000" b="0" i="0" u="none" strike="noStrike" baseline="0">
+                    <a:effectLst/>
+                  </a:rPr>
+                  <a:t>Time (µs)</a:t>
+                </a:r>
+                <a:r>
+                  <a:rPr lang="en-US" sz="1000" b="0" i="0" u="none" strike="noStrike" baseline="0"/>
+                  <a:t> </a:t>
+                </a:r>
+                <a:endParaRPr lang="en-US"/>
+              </a:p>
+            </c:rich>
+          </c:tx>
+          <c:overlay val="0"/>
+          <c:spPr>
+            <a:noFill/>
+            <a:ln>
+              <a:noFill/>
+            </a:ln>
+            <a:effectLst/>
+          </c:spPr>
+          <c:txPr>
+            <a:bodyPr rot="-5400000" spcFirstLastPara="1" vertOverflow="ellipsis" vert="horz" wrap="square" anchor="ctr" anchorCtr="1"/>
+            <a:lstStyle/>
+            <a:p>
+              <a:pPr>
+                <a:defRPr sz="1000" b="0" i="0" u="none" strike="noStrike" kern="1200" baseline="0">
+                  <a:solidFill>
+                    <a:schemeClr val="tx1">
+                      <a:lumMod val="65000"/>
+                      <a:lumOff val="35000"/>
+                    </a:schemeClr>
+                  </a:solidFill>
+                  <a:latin typeface="+mn-lt"/>
+                  <a:ea typeface="+mn-ea"/>
+                  <a:cs typeface="+mn-cs"/>
+                </a:defRPr>
+              </a:pPr>
+              <a:endParaRPr lang="en-US"/>
+            </a:p>
+          </c:txPr>
+        </c:title>
+        <c:numFmt formatCode="General" sourceLinked="1"/>
+        <c:majorTickMark val="none"/>
+        <c:minorTickMark val="none"/>
+        <c:tickLblPos val="nextTo"/>
+        <c:spPr>
+          <a:noFill/>
+          <a:ln w="9525" cap="flat" cmpd="sng" algn="ctr">
+            <a:solidFill>
+              <a:schemeClr val="tx1">
+                <a:lumMod val="25000"/>
+                <a:lumOff val="75000"/>
+              </a:schemeClr>
+            </a:solidFill>
+            <a:round/>
+          </a:ln>
+          <a:effectLst/>
+        </c:spPr>
+        <c:txPr>
+          <a:bodyPr rot="-60000000" spcFirstLastPara="1" vertOverflow="ellipsis" vert="horz" wrap="square" anchor="ctr" anchorCtr="1"/>
+          <a:lstStyle/>
+          <a:p>
+            <a:pPr>
+              <a:defRPr sz="900" b="0" i="0" u="none" strike="noStrike" kern="1200" baseline="0">
+                <a:solidFill>
+                  <a:schemeClr val="tx1">
+                    <a:lumMod val="65000"/>
+                    <a:lumOff val="35000"/>
+                  </a:schemeClr>
+                </a:solidFill>
+                <a:latin typeface="+mn-lt"/>
+                <a:ea typeface="+mn-ea"/>
+                <a:cs typeface="+mn-cs"/>
+              </a:defRPr>
+            </a:pPr>
+            <a:endParaRPr lang="en-US"/>
+          </a:p>
+        </c:txPr>
+        <c:crossAx val="1007570592"/>
+        <c:crosses val="autoZero"/>
+        <c:crossBetween val="midCat"/>
+      </c:valAx>
+      <c:spPr>
+        <a:noFill/>
+        <a:ln>
+          <a:noFill/>
+        </a:ln>
+        <a:effectLst/>
+      </c:spPr>
+    </c:plotArea>
+    <c:plotVisOnly val="1"/>
+    <c:dispBlanksAs val="gap"/>
+    <c:extLst>
+      <c:ext xmlns:c16r3="http://schemas.microsoft.com/office/drawing/2017/03/chart" uri="{56B9EC1D-385E-4148-901F-78D8002777C0}">
+        <c16r3:dataDisplayOptions16>
+          <c16r3:dispNaAsBlank val="1"/>
+        </c16r3:dataDisplayOptions16>
+      </c:ext>
+    </c:extLst>
+    <c:showDLblsOverMax val="0"/>
+  </c:chart>
+  <c:spPr>
+    <a:noFill/>
+    <a:ln>
+      <a:noFill/>
+    </a:ln>
+    <a:effectLst/>
+  </c:spPr>
+  <c:txPr>
+    <a:bodyPr/>
+    <a:lstStyle/>
+    <a:p>
+      <a:pPr>
+        <a:defRPr/>
+      </a:pPr>
+      <a:endParaRPr lang="en-US"/>
+    </a:p>
+  </c:txPr>
+  <c:externalData r:id="rId3">
+    <c:autoUpdate val="0"/>
+  </c:externalData>
+</c:chartSpace>
+</file>
+
+<file path=ppt/charts/chart8.xml><?xml version="1.0" encoding="utf-8"?>
 <c:chartSpace xmlns:c="http://schemas.openxmlformats.org/drawingml/2006/chart" xmlns:a="http://schemas.openxmlformats.org/drawingml/2006/main" xmlns:r="http://schemas.openxmlformats.org/officeDocument/2006/relationships" xmlns:c16r2="http://schemas.microsoft.com/office/drawing/2015/06/chart">
   <c:date1904 val="0"/>
   <c:lang val="en-US"/>
@@ -3268,7 +4144,7 @@
 </c:chartSpace>
 </file>
 
-<file path=ppt/charts/chart7.xml><?xml version="1.0" encoding="utf-8"?>
+<file path=ppt/charts/chart9.xml><?xml version="1.0" encoding="utf-8"?>
 <c:chartSpace xmlns:c="http://schemas.openxmlformats.org/drawingml/2006/chart" xmlns:a="http://schemas.openxmlformats.org/drawingml/2006/main" xmlns:r="http://schemas.openxmlformats.org/officeDocument/2006/relationships" xmlns:c16r2="http://schemas.microsoft.com/office/drawing/2015/06/chart">
   <c:date1904 val="0"/>
   <c:lang val="en-US"/>
@@ -3729,920 +4605,6 @@
           </a:p>
         </c:txPr>
         <c:crossAx val="1314225680"/>
-        <c:crosses val="autoZero"/>
-        <c:crossBetween val="midCat"/>
-      </c:valAx>
-      <c:spPr>
-        <a:noFill/>
-        <a:ln>
-          <a:noFill/>
-        </a:ln>
-        <a:effectLst/>
-      </c:spPr>
-    </c:plotArea>
-    <c:plotVisOnly val="1"/>
-    <c:dispBlanksAs val="gap"/>
-    <c:extLst>
-      <c:ext xmlns:c16r3="http://schemas.microsoft.com/office/drawing/2017/03/chart" uri="{56B9EC1D-385E-4148-901F-78D8002777C0}">
-        <c16r3:dataDisplayOptions16>
-          <c16r3:dispNaAsBlank val="1"/>
-        </c16r3:dataDisplayOptions16>
-      </c:ext>
-    </c:extLst>
-    <c:showDLblsOverMax val="0"/>
-  </c:chart>
-  <c:spPr>
-    <a:noFill/>
-    <a:ln>
-      <a:noFill/>
-    </a:ln>
-    <a:effectLst/>
-  </c:spPr>
-  <c:txPr>
-    <a:bodyPr/>
-    <a:lstStyle/>
-    <a:p>
-      <a:pPr>
-        <a:defRPr/>
-      </a:pPr>
-      <a:endParaRPr lang="en-US"/>
-    </a:p>
-  </c:txPr>
-  <c:externalData r:id="rId3">
-    <c:autoUpdate val="0"/>
-  </c:externalData>
-</c:chartSpace>
-</file>
-
-<file path=ppt/charts/chart8.xml><?xml version="1.0" encoding="utf-8"?>
-<c:chartSpace xmlns:c="http://schemas.openxmlformats.org/drawingml/2006/chart" xmlns:a="http://schemas.openxmlformats.org/drawingml/2006/main" xmlns:r="http://schemas.openxmlformats.org/officeDocument/2006/relationships" xmlns:c16r2="http://schemas.microsoft.com/office/drawing/2015/06/chart">
-  <c:date1904 val="0"/>
-  <c:lang val="en-US"/>
-  <c:roundedCorners val="0"/>
-  <mc:AlternateContent xmlns:mc="http://schemas.openxmlformats.org/markup-compatibility/2006">
-    <mc:Choice xmlns:c14="http://schemas.microsoft.com/office/drawing/2007/8/2/chart" Requires="c14">
-      <c14:style val="102"/>
-    </mc:Choice>
-    <mc:Fallback>
-      <c:style val="2"/>
-    </mc:Fallback>
-  </mc:AlternateContent>
-  <c:chart>
-    <c:title>
-      <c:tx>
-        <c:rich>
-          <a:bodyPr rot="0" spcFirstLastPara="1" vertOverflow="ellipsis" vert="horz" wrap="square" anchor="ctr" anchorCtr="1"/>
-          <a:lstStyle/>
-          <a:p>
-            <a:pPr>
-              <a:defRPr sz="1400" b="0" i="0" u="none" strike="noStrike" kern="1200" spc="0" baseline="0">
-                <a:solidFill>
-                  <a:schemeClr val="tx1">
-                    <a:lumMod val="65000"/>
-                    <a:lumOff val="35000"/>
-                  </a:schemeClr>
-                </a:solidFill>
-                <a:latin typeface="+mn-lt"/>
-                <a:ea typeface="+mn-ea"/>
-                <a:cs typeface="+mn-cs"/>
-              </a:defRPr>
-            </a:pPr>
-            <a:r>
-              <a:rPr lang="en-US"/>
-              <a:t>KMP (No Match), Size 50 Pattern</a:t>
-            </a:r>
-          </a:p>
-        </c:rich>
-      </c:tx>
-      <c:overlay val="0"/>
-      <c:spPr>
-        <a:noFill/>
-        <a:ln>
-          <a:noFill/>
-        </a:ln>
-        <a:effectLst/>
-      </c:spPr>
-      <c:txPr>
-        <a:bodyPr rot="0" spcFirstLastPara="1" vertOverflow="ellipsis" vert="horz" wrap="square" anchor="ctr" anchorCtr="1"/>
-        <a:lstStyle/>
-        <a:p>
-          <a:pPr>
-            <a:defRPr sz="1400" b="0" i="0" u="none" strike="noStrike" kern="1200" spc="0" baseline="0">
-              <a:solidFill>
-                <a:schemeClr val="tx1">
-                  <a:lumMod val="65000"/>
-                  <a:lumOff val="35000"/>
-                </a:schemeClr>
-              </a:solidFill>
-              <a:latin typeface="+mn-lt"/>
-              <a:ea typeface="+mn-ea"/>
-              <a:cs typeface="+mn-cs"/>
-            </a:defRPr>
-          </a:pPr>
-          <a:endParaRPr lang="en-US"/>
-        </a:p>
-      </c:txPr>
-    </c:title>
-    <c:autoTitleDeleted val="0"/>
-    <c:plotArea>
-      <c:layout/>
-      <c:scatterChart>
-        <c:scatterStyle val="lineMarker"/>
-        <c:varyColors val="0"/>
-        <c:ser>
-          <c:idx val="0"/>
-          <c:order val="0"/>
-          <c:tx>
-            <c:strRef>
-              <c:f>Sheet1!$E$16:$E$17</c:f>
-              <c:strCache>
-                <c:ptCount val="2"/>
-                <c:pt idx="0">
-                  <c:v>KMP (No Match), Size 50 Pattern</c:v>
-                </c:pt>
-                <c:pt idx="1">
-                  <c:v>Time (µs)</c:v>
-                </c:pt>
-              </c:strCache>
-            </c:strRef>
-          </c:tx>
-          <c:spPr>
-            <a:ln w="19050" cap="rnd">
-              <a:noFill/>
-              <a:round/>
-            </a:ln>
-            <a:effectLst/>
-          </c:spPr>
-          <c:marker>
-            <c:symbol val="circle"/>
-            <c:size val="5"/>
-            <c:spPr>
-              <a:solidFill>
-                <a:schemeClr val="accent1"/>
-              </a:solidFill>
-              <a:ln w="9525">
-                <a:solidFill>
-                  <a:schemeClr val="accent1"/>
-                </a:solidFill>
-              </a:ln>
-              <a:effectLst/>
-            </c:spPr>
-          </c:marker>
-          <c:xVal>
-            <c:numRef>
-              <c:f>Sheet1!$D$18:$D$21</c:f>
-              <c:numCache>
-                <c:formatCode>General</c:formatCode>
-                <c:ptCount val="4"/>
-                <c:pt idx="0">
-                  <c:v>100</c:v>
-                </c:pt>
-                <c:pt idx="1">
-                  <c:v>1000</c:v>
-                </c:pt>
-                <c:pt idx="2">
-                  <c:v>10000</c:v>
-                </c:pt>
-                <c:pt idx="3">
-                  <c:v>100000</c:v>
-                </c:pt>
-              </c:numCache>
-            </c:numRef>
-          </c:xVal>
-          <c:yVal>
-            <c:numRef>
-              <c:f>Sheet1!$E$18:$E$21</c:f>
-              <c:numCache>
-                <c:formatCode>General</c:formatCode>
-                <c:ptCount val="4"/>
-                <c:pt idx="0">
-                  <c:v>0</c:v>
-                </c:pt>
-                <c:pt idx="1">
-                  <c:v>0</c:v>
-                </c:pt>
-                <c:pt idx="2">
-                  <c:v>0</c:v>
-                </c:pt>
-                <c:pt idx="3">
-                  <c:v>1</c:v>
-                </c:pt>
-              </c:numCache>
-            </c:numRef>
-          </c:yVal>
-          <c:smooth val="0"/>
-          <c:extLst>
-            <c:ext xmlns:c16="http://schemas.microsoft.com/office/drawing/2014/chart" uri="{C3380CC4-5D6E-409C-BE32-E72D297353CC}">
-              <c16:uniqueId val="{00000000-E8EA-41BE-82E8-B2392567F7D1}"/>
-            </c:ext>
-          </c:extLst>
-        </c:ser>
-        <c:dLbls>
-          <c:showLegendKey val="0"/>
-          <c:showVal val="0"/>
-          <c:showCatName val="0"/>
-          <c:showSerName val="0"/>
-          <c:showPercent val="0"/>
-          <c:showBubbleSize val="0"/>
-        </c:dLbls>
-        <c:axId val="1426002496"/>
-        <c:axId val="1432452384"/>
-      </c:scatterChart>
-      <c:valAx>
-        <c:axId val="1426002496"/>
-        <c:scaling>
-          <c:orientation val="minMax"/>
-        </c:scaling>
-        <c:delete val="0"/>
-        <c:axPos val="b"/>
-        <c:majorGridlines>
-          <c:spPr>
-            <a:ln w="9525" cap="flat" cmpd="sng" algn="ctr">
-              <a:solidFill>
-                <a:schemeClr val="tx1">
-                  <a:lumMod val="15000"/>
-                  <a:lumOff val="85000"/>
-                </a:schemeClr>
-              </a:solidFill>
-              <a:round/>
-            </a:ln>
-            <a:effectLst/>
-          </c:spPr>
-        </c:majorGridlines>
-        <c:title>
-          <c:tx>
-            <c:rich>
-              <a:bodyPr rot="0" spcFirstLastPara="1" vertOverflow="ellipsis" vert="horz" wrap="square" anchor="ctr" anchorCtr="1"/>
-              <a:lstStyle/>
-              <a:p>
-                <a:pPr>
-                  <a:defRPr sz="1000" b="0" i="0" u="none" strike="noStrike" kern="1200" baseline="0">
-                    <a:solidFill>
-                      <a:schemeClr val="tx1">
-                        <a:lumMod val="65000"/>
-                        <a:lumOff val="35000"/>
-                      </a:schemeClr>
-                    </a:solidFill>
-                    <a:latin typeface="+mn-lt"/>
-                    <a:ea typeface="+mn-ea"/>
-                    <a:cs typeface="+mn-cs"/>
-                  </a:defRPr>
-                </a:pPr>
-                <a:r>
-                  <a:rPr lang="en-US"/>
-                  <a:t>Text Length</a:t>
-                </a:r>
-              </a:p>
-            </c:rich>
-          </c:tx>
-          <c:overlay val="0"/>
-          <c:spPr>
-            <a:noFill/>
-            <a:ln>
-              <a:noFill/>
-            </a:ln>
-            <a:effectLst/>
-          </c:spPr>
-          <c:txPr>
-            <a:bodyPr rot="0" spcFirstLastPara="1" vertOverflow="ellipsis" vert="horz" wrap="square" anchor="ctr" anchorCtr="1"/>
-            <a:lstStyle/>
-            <a:p>
-              <a:pPr>
-                <a:defRPr sz="1000" b="0" i="0" u="none" strike="noStrike" kern="1200" baseline="0">
-                  <a:solidFill>
-                    <a:schemeClr val="tx1">
-                      <a:lumMod val="65000"/>
-                      <a:lumOff val="35000"/>
-                    </a:schemeClr>
-                  </a:solidFill>
-                  <a:latin typeface="+mn-lt"/>
-                  <a:ea typeface="+mn-ea"/>
-                  <a:cs typeface="+mn-cs"/>
-                </a:defRPr>
-              </a:pPr>
-              <a:endParaRPr lang="en-US"/>
-            </a:p>
-          </c:txPr>
-        </c:title>
-        <c:numFmt formatCode="General" sourceLinked="1"/>
-        <c:majorTickMark val="none"/>
-        <c:minorTickMark val="none"/>
-        <c:tickLblPos val="nextTo"/>
-        <c:spPr>
-          <a:noFill/>
-          <a:ln w="9525" cap="flat" cmpd="sng" algn="ctr">
-            <a:solidFill>
-              <a:schemeClr val="tx1">
-                <a:lumMod val="25000"/>
-                <a:lumOff val="75000"/>
-              </a:schemeClr>
-            </a:solidFill>
-            <a:round/>
-          </a:ln>
-          <a:effectLst/>
-        </c:spPr>
-        <c:txPr>
-          <a:bodyPr rot="-60000000" spcFirstLastPara="1" vertOverflow="ellipsis" vert="horz" wrap="square" anchor="ctr" anchorCtr="1"/>
-          <a:lstStyle/>
-          <a:p>
-            <a:pPr>
-              <a:defRPr sz="900" b="0" i="0" u="none" strike="noStrike" kern="1200" baseline="0">
-                <a:solidFill>
-                  <a:schemeClr val="tx1">
-                    <a:lumMod val="65000"/>
-                    <a:lumOff val="35000"/>
-                  </a:schemeClr>
-                </a:solidFill>
-                <a:latin typeface="+mn-lt"/>
-                <a:ea typeface="+mn-ea"/>
-                <a:cs typeface="+mn-cs"/>
-              </a:defRPr>
-            </a:pPr>
-            <a:endParaRPr lang="en-US"/>
-          </a:p>
-        </c:txPr>
-        <c:crossAx val="1432452384"/>
-        <c:crosses val="autoZero"/>
-        <c:crossBetween val="midCat"/>
-      </c:valAx>
-      <c:valAx>
-        <c:axId val="1432452384"/>
-        <c:scaling>
-          <c:orientation val="minMax"/>
-        </c:scaling>
-        <c:delete val="0"/>
-        <c:axPos val="l"/>
-        <c:majorGridlines>
-          <c:spPr>
-            <a:ln w="9525" cap="flat" cmpd="sng" algn="ctr">
-              <a:solidFill>
-                <a:schemeClr val="tx1">
-                  <a:lumMod val="15000"/>
-                  <a:lumOff val="85000"/>
-                </a:schemeClr>
-              </a:solidFill>
-              <a:round/>
-            </a:ln>
-            <a:effectLst/>
-          </c:spPr>
-        </c:majorGridlines>
-        <c:title>
-          <c:tx>
-            <c:rich>
-              <a:bodyPr rot="-5400000" spcFirstLastPara="1" vertOverflow="ellipsis" vert="horz" wrap="square" anchor="ctr" anchorCtr="1"/>
-              <a:lstStyle/>
-              <a:p>
-                <a:pPr>
-                  <a:defRPr sz="1000" b="0" i="0" u="none" strike="noStrike" kern="1200" baseline="0">
-                    <a:solidFill>
-                      <a:schemeClr val="tx1">
-                        <a:lumMod val="65000"/>
-                        <a:lumOff val="35000"/>
-                      </a:schemeClr>
-                    </a:solidFill>
-                    <a:latin typeface="+mn-lt"/>
-                    <a:ea typeface="+mn-ea"/>
-                    <a:cs typeface="+mn-cs"/>
-                  </a:defRPr>
-                </a:pPr>
-                <a:r>
-                  <a:rPr lang="en-US" sz="1000" b="0" i="0" u="none" strike="noStrike" baseline="0">
-                    <a:effectLst/>
-                  </a:rPr>
-                  <a:t>Time (µs)</a:t>
-                </a:r>
-                <a:r>
-                  <a:rPr lang="en-US" sz="1000" b="0" i="0" u="none" strike="noStrike" baseline="0"/>
-                  <a:t> </a:t>
-                </a:r>
-                <a:endParaRPr lang="en-US"/>
-              </a:p>
-            </c:rich>
-          </c:tx>
-          <c:overlay val="0"/>
-          <c:spPr>
-            <a:noFill/>
-            <a:ln>
-              <a:noFill/>
-            </a:ln>
-            <a:effectLst/>
-          </c:spPr>
-          <c:txPr>
-            <a:bodyPr rot="-5400000" spcFirstLastPara="1" vertOverflow="ellipsis" vert="horz" wrap="square" anchor="ctr" anchorCtr="1"/>
-            <a:lstStyle/>
-            <a:p>
-              <a:pPr>
-                <a:defRPr sz="1000" b="0" i="0" u="none" strike="noStrike" kern="1200" baseline="0">
-                  <a:solidFill>
-                    <a:schemeClr val="tx1">
-                      <a:lumMod val="65000"/>
-                      <a:lumOff val="35000"/>
-                    </a:schemeClr>
-                  </a:solidFill>
-                  <a:latin typeface="+mn-lt"/>
-                  <a:ea typeface="+mn-ea"/>
-                  <a:cs typeface="+mn-cs"/>
-                </a:defRPr>
-              </a:pPr>
-              <a:endParaRPr lang="en-US"/>
-            </a:p>
-          </c:txPr>
-        </c:title>
-        <c:numFmt formatCode="General" sourceLinked="1"/>
-        <c:majorTickMark val="none"/>
-        <c:minorTickMark val="none"/>
-        <c:tickLblPos val="nextTo"/>
-        <c:spPr>
-          <a:noFill/>
-          <a:ln w="9525" cap="flat" cmpd="sng" algn="ctr">
-            <a:solidFill>
-              <a:schemeClr val="tx1">
-                <a:lumMod val="25000"/>
-                <a:lumOff val="75000"/>
-              </a:schemeClr>
-            </a:solidFill>
-            <a:round/>
-          </a:ln>
-          <a:effectLst/>
-        </c:spPr>
-        <c:txPr>
-          <a:bodyPr rot="-60000000" spcFirstLastPara="1" vertOverflow="ellipsis" vert="horz" wrap="square" anchor="ctr" anchorCtr="1"/>
-          <a:lstStyle/>
-          <a:p>
-            <a:pPr>
-              <a:defRPr sz="900" b="0" i="0" u="none" strike="noStrike" kern="1200" baseline="0">
-                <a:solidFill>
-                  <a:schemeClr val="tx1">
-                    <a:lumMod val="65000"/>
-                    <a:lumOff val="35000"/>
-                  </a:schemeClr>
-                </a:solidFill>
-                <a:latin typeface="+mn-lt"/>
-                <a:ea typeface="+mn-ea"/>
-                <a:cs typeface="+mn-cs"/>
-              </a:defRPr>
-            </a:pPr>
-            <a:endParaRPr lang="en-US"/>
-          </a:p>
-        </c:txPr>
-        <c:crossAx val="1426002496"/>
-        <c:crosses val="autoZero"/>
-        <c:crossBetween val="midCat"/>
-      </c:valAx>
-      <c:spPr>
-        <a:noFill/>
-        <a:ln>
-          <a:noFill/>
-        </a:ln>
-        <a:effectLst/>
-      </c:spPr>
-    </c:plotArea>
-    <c:plotVisOnly val="1"/>
-    <c:dispBlanksAs val="gap"/>
-    <c:extLst>
-      <c:ext xmlns:c16r3="http://schemas.microsoft.com/office/drawing/2017/03/chart" uri="{56B9EC1D-385E-4148-901F-78D8002777C0}">
-        <c16r3:dataDisplayOptions16>
-          <c16r3:dispNaAsBlank val="1"/>
-        </c16r3:dataDisplayOptions16>
-      </c:ext>
-    </c:extLst>
-    <c:showDLblsOverMax val="0"/>
-  </c:chart>
-  <c:spPr>
-    <a:noFill/>
-    <a:ln>
-      <a:noFill/>
-    </a:ln>
-    <a:effectLst/>
-  </c:spPr>
-  <c:txPr>
-    <a:bodyPr/>
-    <a:lstStyle/>
-    <a:p>
-      <a:pPr>
-        <a:defRPr/>
-      </a:pPr>
-      <a:endParaRPr lang="en-US"/>
-    </a:p>
-  </c:txPr>
-  <c:externalData r:id="rId3">
-    <c:autoUpdate val="0"/>
-  </c:externalData>
-</c:chartSpace>
-</file>
-
-<file path=ppt/charts/chart9.xml><?xml version="1.0" encoding="utf-8"?>
-<c:chartSpace xmlns:c="http://schemas.openxmlformats.org/drawingml/2006/chart" xmlns:a="http://schemas.openxmlformats.org/drawingml/2006/main" xmlns:r="http://schemas.openxmlformats.org/officeDocument/2006/relationships" xmlns:c16r2="http://schemas.microsoft.com/office/drawing/2015/06/chart">
-  <c:date1904 val="0"/>
-  <c:lang val="en-US"/>
-  <c:roundedCorners val="0"/>
-  <mc:AlternateContent xmlns:mc="http://schemas.openxmlformats.org/markup-compatibility/2006">
-    <mc:Choice xmlns:c14="http://schemas.microsoft.com/office/drawing/2007/8/2/chart" Requires="c14">
-      <c14:style val="102"/>
-    </mc:Choice>
-    <mc:Fallback>
-      <c:style val="2"/>
-    </mc:Fallback>
-  </mc:AlternateContent>
-  <c:chart>
-    <c:title>
-      <c:tx>
-        <c:rich>
-          <a:bodyPr rot="0" spcFirstLastPara="1" vertOverflow="ellipsis" vert="horz" wrap="square" anchor="ctr" anchorCtr="1"/>
-          <a:lstStyle/>
-          <a:p>
-            <a:pPr>
-              <a:defRPr sz="1400" b="0" i="0" u="none" strike="noStrike" kern="1200" spc="0" baseline="0">
-                <a:solidFill>
-                  <a:schemeClr val="tx1">
-                    <a:lumMod val="65000"/>
-                    <a:lumOff val="35000"/>
-                  </a:schemeClr>
-                </a:solidFill>
-                <a:latin typeface="+mn-lt"/>
-                <a:ea typeface="+mn-ea"/>
-                <a:cs typeface="+mn-cs"/>
-              </a:defRPr>
-            </a:pPr>
-            <a:r>
-              <a:rPr lang="en-US"/>
-              <a:t>KMP (Match), Size 50 Pattern</a:t>
-            </a:r>
-          </a:p>
-        </c:rich>
-      </c:tx>
-      <c:overlay val="0"/>
-      <c:spPr>
-        <a:noFill/>
-        <a:ln>
-          <a:noFill/>
-        </a:ln>
-        <a:effectLst/>
-      </c:spPr>
-      <c:txPr>
-        <a:bodyPr rot="0" spcFirstLastPara="1" vertOverflow="ellipsis" vert="horz" wrap="square" anchor="ctr" anchorCtr="1"/>
-        <a:lstStyle/>
-        <a:p>
-          <a:pPr>
-            <a:defRPr sz="1400" b="0" i="0" u="none" strike="noStrike" kern="1200" spc="0" baseline="0">
-              <a:solidFill>
-                <a:schemeClr val="tx1">
-                  <a:lumMod val="65000"/>
-                  <a:lumOff val="35000"/>
-                </a:schemeClr>
-              </a:solidFill>
-              <a:latin typeface="+mn-lt"/>
-              <a:ea typeface="+mn-ea"/>
-              <a:cs typeface="+mn-cs"/>
-            </a:defRPr>
-          </a:pPr>
-          <a:endParaRPr lang="en-US"/>
-        </a:p>
-      </c:txPr>
-    </c:title>
-    <c:autoTitleDeleted val="0"/>
-    <c:plotArea>
-      <c:layout/>
-      <c:scatterChart>
-        <c:scatterStyle val="lineMarker"/>
-        <c:varyColors val="0"/>
-        <c:ser>
-          <c:idx val="0"/>
-          <c:order val="0"/>
-          <c:tx>
-            <c:strRef>
-              <c:f>Sheet1!$B$16:$B$17</c:f>
-              <c:strCache>
-                <c:ptCount val="2"/>
-                <c:pt idx="0">
-                  <c:v>KMP (Match), Size 50 Pattern</c:v>
-                </c:pt>
-                <c:pt idx="1">
-                  <c:v>Time (µs)</c:v>
-                </c:pt>
-              </c:strCache>
-            </c:strRef>
-          </c:tx>
-          <c:spPr>
-            <a:ln w="19050" cap="rnd">
-              <a:noFill/>
-              <a:round/>
-            </a:ln>
-            <a:effectLst/>
-          </c:spPr>
-          <c:marker>
-            <c:symbol val="circle"/>
-            <c:size val="5"/>
-            <c:spPr>
-              <a:solidFill>
-                <a:schemeClr val="accent1"/>
-              </a:solidFill>
-              <a:ln w="9525">
-                <a:solidFill>
-                  <a:schemeClr val="accent1"/>
-                </a:solidFill>
-              </a:ln>
-              <a:effectLst/>
-            </c:spPr>
-          </c:marker>
-          <c:xVal>
-            <c:numRef>
-              <c:f>Sheet1!$A$18:$A$21</c:f>
-              <c:numCache>
-                <c:formatCode>General</c:formatCode>
-                <c:ptCount val="4"/>
-                <c:pt idx="0">
-                  <c:v>100</c:v>
-                </c:pt>
-                <c:pt idx="1">
-                  <c:v>1000</c:v>
-                </c:pt>
-                <c:pt idx="2">
-                  <c:v>10000</c:v>
-                </c:pt>
-                <c:pt idx="3">
-                  <c:v>100000</c:v>
-                </c:pt>
-              </c:numCache>
-            </c:numRef>
-          </c:xVal>
-          <c:yVal>
-            <c:numRef>
-              <c:f>Sheet1!$B$18:$B$21</c:f>
-              <c:numCache>
-                <c:formatCode>General</c:formatCode>
-                <c:ptCount val="4"/>
-                <c:pt idx="0">
-                  <c:v>0</c:v>
-                </c:pt>
-                <c:pt idx="1">
-                  <c:v>0</c:v>
-                </c:pt>
-                <c:pt idx="2">
-                  <c:v>0</c:v>
-                </c:pt>
-                <c:pt idx="3">
-                  <c:v>1</c:v>
-                </c:pt>
-              </c:numCache>
-            </c:numRef>
-          </c:yVal>
-          <c:smooth val="0"/>
-          <c:extLst>
-            <c:ext xmlns:c16="http://schemas.microsoft.com/office/drawing/2014/chart" uri="{C3380CC4-5D6E-409C-BE32-E72D297353CC}">
-              <c16:uniqueId val="{00000000-113C-481D-8392-406AB32FB1C0}"/>
-            </c:ext>
-          </c:extLst>
-        </c:ser>
-        <c:dLbls>
-          <c:showLegendKey val="0"/>
-          <c:showVal val="0"/>
-          <c:showCatName val="0"/>
-          <c:showSerName val="0"/>
-          <c:showPercent val="0"/>
-          <c:showBubbleSize val="0"/>
-        </c:dLbls>
-        <c:axId val="1007570592"/>
-        <c:axId val="1432458208"/>
-      </c:scatterChart>
-      <c:valAx>
-        <c:axId val="1007570592"/>
-        <c:scaling>
-          <c:orientation val="minMax"/>
-        </c:scaling>
-        <c:delete val="0"/>
-        <c:axPos val="b"/>
-        <c:majorGridlines>
-          <c:spPr>
-            <a:ln w="9525" cap="flat" cmpd="sng" algn="ctr">
-              <a:solidFill>
-                <a:schemeClr val="tx1">
-                  <a:lumMod val="15000"/>
-                  <a:lumOff val="85000"/>
-                </a:schemeClr>
-              </a:solidFill>
-              <a:round/>
-            </a:ln>
-            <a:effectLst/>
-          </c:spPr>
-        </c:majorGridlines>
-        <c:title>
-          <c:tx>
-            <c:rich>
-              <a:bodyPr rot="0" spcFirstLastPara="1" vertOverflow="ellipsis" vert="horz" wrap="square" anchor="ctr" anchorCtr="1"/>
-              <a:lstStyle/>
-              <a:p>
-                <a:pPr>
-                  <a:defRPr sz="1000" b="0" i="0" u="none" strike="noStrike" kern="1200" baseline="0">
-                    <a:solidFill>
-                      <a:schemeClr val="tx1">
-                        <a:lumMod val="65000"/>
-                        <a:lumOff val="35000"/>
-                      </a:schemeClr>
-                    </a:solidFill>
-                    <a:latin typeface="+mn-lt"/>
-                    <a:ea typeface="+mn-ea"/>
-                    <a:cs typeface="+mn-cs"/>
-                  </a:defRPr>
-                </a:pPr>
-                <a:r>
-                  <a:rPr lang="en-US"/>
-                  <a:t>Text Length</a:t>
-                </a:r>
-              </a:p>
-            </c:rich>
-          </c:tx>
-          <c:overlay val="0"/>
-          <c:spPr>
-            <a:noFill/>
-            <a:ln>
-              <a:noFill/>
-            </a:ln>
-            <a:effectLst/>
-          </c:spPr>
-          <c:txPr>
-            <a:bodyPr rot="0" spcFirstLastPara="1" vertOverflow="ellipsis" vert="horz" wrap="square" anchor="ctr" anchorCtr="1"/>
-            <a:lstStyle/>
-            <a:p>
-              <a:pPr>
-                <a:defRPr sz="1000" b="0" i="0" u="none" strike="noStrike" kern="1200" baseline="0">
-                  <a:solidFill>
-                    <a:schemeClr val="tx1">
-                      <a:lumMod val="65000"/>
-                      <a:lumOff val="35000"/>
-                    </a:schemeClr>
-                  </a:solidFill>
-                  <a:latin typeface="+mn-lt"/>
-                  <a:ea typeface="+mn-ea"/>
-                  <a:cs typeface="+mn-cs"/>
-                </a:defRPr>
-              </a:pPr>
-              <a:endParaRPr lang="en-US"/>
-            </a:p>
-          </c:txPr>
-        </c:title>
-        <c:numFmt formatCode="General" sourceLinked="1"/>
-        <c:majorTickMark val="none"/>
-        <c:minorTickMark val="none"/>
-        <c:tickLblPos val="nextTo"/>
-        <c:spPr>
-          <a:noFill/>
-          <a:ln w="9525" cap="flat" cmpd="sng" algn="ctr">
-            <a:solidFill>
-              <a:schemeClr val="tx1">
-                <a:lumMod val="25000"/>
-                <a:lumOff val="75000"/>
-              </a:schemeClr>
-            </a:solidFill>
-            <a:round/>
-          </a:ln>
-          <a:effectLst/>
-        </c:spPr>
-        <c:txPr>
-          <a:bodyPr rot="-60000000" spcFirstLastPara="1" vertOverflow="ellipsis" vert="horz" wrap="square" anchor="ctr" anchorCtr="1"/>
-          <a:lstStyle/>
-          <a:p>
-            <a:pPr>
-              <a:defRPr sz="900" b="0" i="0" u="none" strike="noStrike" kern="1200" baseline="0">
-                <a:solidFill>
-                  <a:schemeClr val="tx1">
-                    <a:lumMod val="65000"/>
-                    <a:lumOff val="35000"/>
-                  </a:schemeClr>
-                </a:solidFill>
-                <a:latin typeface="+mn-lt"/>
-                <a:ea typeface="+mn-ea"/>
-                <a:cs typeface="+mn-cs"/>
-              </a:defRPr>
-            </a:pPr>
-            <a:endParaRPr lang="en-US"/>
-          </a:p>
-        </c:txPr>
-        <c:crossAx val="1432458208"/>
-        <c:crosses val="autoZero"/>
-        <c:crossBetween val="midCat"/>
-      </c:valAx>
-      <c:valAx>
-        <c:axId val="1432458208"/>
-        <c:scaling>
-          <c:orientation val="minMax"/>
-        </c:scaling>
-        <c:delete val="0"/>
-        <c:axPos val="l"/>
-        <c:majorGridlines>
-          <c:spPr>
-            <a:ln w="9525" cap="flat" cmpd="sng" algn="ctr">
-              <a:solidFill>
-                <a:schemeClr val="tx1">
-                  <a:lumMod val="15000"/>
-                  <a:lumOff val="85000"/>
-                </a:schemeClr>
-              </a:solidFill>
-              <a:round/>
-            </a:ln>
-            <a:effectLst/>
-          </c:spPr>
-        </c:majorGridlines>
-        <c:title>
-          <c:tx>
-            <c:rich>
-              <a:bodyPr rot="-5400000" spcFirstLastPara="1" vertOverflow="ellipsis" vert="horz" wrap="square" anchor="ctr" anchorCtr="1"/>
-              <a:lstStyle/>
-              <a:p>
-                <a:pPr>
-                  <a:defRPr sz="1000" b="0" i="0" u="none" strike="noStrike" kern="1200" baseline="0">
-                    <a:solidFill>
-                      <a:schemeClr val="tx1">
-                        <a:lumMod val="65000"/>
-                        <a:lumOff val="35000"/>
-                      </a:schemeClr>
-                    </a:solidFill>
-                    <a:latin typeface="+mn-lt"/>
-                    <a:ea typeface="+mn-ea"/>
-                    <a:cs typeface="+mn-cs"/>
-                  </a:defRPr>
-                </a:pPr>
-                <a:r>
-                  <a:rPr lang="en-US" sz="1000" b="0" i="0" u="none" strike="noStrike" baseline="0">
-                    <a:effectLst/>
-                  </a:rPr>
-                  <a:t>Time (µs)</a:t>
-                </a:r>
-                <a:r>
-                  <a:rPr lang="en-US" sz="1000" b="0" i="0" u="none" strike="noStrike" baseline="0"/>
-                  <a:t> </a:t>
-                </a:r>
-                <a:endParaRPr lang="en-US"/>
-              </a:p>
-            </c:rich>
-          </c:tx>
-          <c:overlay val="0"/>
-          <c:spPr>
-            <a:noFill/>
-            <a:ln>
-              <a:noFill/>
-            </a:ln>
-            <a:effectLst/>
-          </c:spPr>
-          <c:txPr>
-            <a:bodyPr rot="-5400000" spcFirstLastPara="1" vertOverflow="ellipsis" vert="horz" wrap="square" anchor="ctr" anchorCtr="1"/>
-            <a:lstStyle/>
-            <a:p>
-              <a:pPr>
-                <a:defRPr sz="1000" b="0" i="0" u="none" strike="noStrike" kern="1200" baseline="0">
-                  <a:solidFill>
-                    <a:schemeClr val="tx1">
-                      <a:lumMod val="65000"/>
-                      <a:lumOff val="35000"/>
-                    </a:schemeClr>
-                  </a:solidFill>
-                  <a:latin typeface="+mn-lt"/>
-                  <a:ea typeface="+mn-ea"/>
-                  <a:cs typeface="+mn-cs"/>
-                </a:defRPr>
-              </a:pPr>
-              <a:endParaRPr lang="en-US"/>
-            </a:p>
-          </c:txPr>
-        </c:title>
-        <c:numFmt formatCode="General" sourceLinked="1"/>
-        <c:majorTickMark val="none"/>
-        <c:minorTickMark val="none"/>
-        <c:tickLblPos val="nextTo"/>
-        <c:spPr>
-          <a:noFill/>
-          <a:ln w="9525" cap="flat" cmpd="sng" algn="ctr">
-            <a:solidFill>
-              <a:schemeClr val="tx1">
-                <a:lumMod val="25000"/>
-                <a:lumOff val="75000"/>
-              </a:schemeClr>
-            </a:solidFill>
-            <a:round/>
-          </a:ln>
-          <a:effectLst/>
-        </c:spPr>
-        <c:txPr>
-          <a:bodyPr rot="-60000000" spcFirstLastPara="1" vertOverflow="ellipsis" vert="horz" wrap="square" anchor="ctr" anchorCtr="1"/>
-          <a:lstStyle/>
-          <a:p>
-            <a:pPr>
-              <a:defRPr sz="900" b="0" i="0" u="none" strike="noStrike" kern="1200" baseline="0">
-                <a:solidFill>
-                  <a:schemeClr val="tx1">
-                    <a:lumMod val="65000"/>
-                    <a:lumOff val="35000"/>
-                  </a:schemeClr>
-                </a:solidFill>
-                <a:latin typeface="+mn-lt"/>
-                <a:ea typeface="+mn-ea"/>
-                <a:cs typeface="+mn-cs"/>
-              </a:defRPr>
-            </a:pPr>
-            <a:endParaRPr lang="en-US"/>
-          </a:p>
-        </c:txPr>
-        <c:crossAx val="1007570592"/>
         <c:crosses val="autoZero"/>
         <c:crossBetween val="midCat"/>
       </c:valAx>
@@ -13392,16 +13354,16 @@
           <a:bodyPr/>
           <a:lstStyle/>
           <a:p>
-            <a:endParaRPr lang="en-US"/>
+            <a:endParaRPr lang="en-US" dirty="0"/>
           </a:p>
         </p:txBody>
       </p:sp>
       <p:graphicFrame>
         <p:nvGraphicFramePr>
-          <p:cNvPr id="4" name="Chart 3">
+          <p:cNvPr id="5" name="Chart 4">
             <a:extLst>
               <a:ext uri="{FF2B5EF4-FFF2-40B4-BE49-F238E27FC236}">
-                <a16:creationId xmlns:a16="http://schemas.microsoft.com/office/drawing/2014/main" id="{004CD414-C5AB-493D-852B-A82309FB15BC}"/>
+                <a16:creationId xmlns:a16="http://schemas.microsoft.com/office/drawing/2014/main" id="{6F2DD175-FDE9-494C-9BA3-A68B079B83F4}"/>
               </a:ext>
             </a:extLst>
           </p:cNvPr>
@@ -13411,7 +13373,7 @@
           <p:nvPr>
             <p:extLst>
               <p:ext uri="{D42A27DB-BD31-4B8C-83A1-F6EECF244321}">
-                <p14:modId xmlns:p14="http://schemas.microsoft.com/office/powerpoint/2010/main" val="4114305642"/>
+                <p14:modId xmlns:p14="http://schemas.microsoft.com/office/powerpoint/2010/main" val="1453690062"/>
               </p:ext>
             </p:extLst>
           </p:nvPr>
@@ -13461,6 +13423,226 @@
           <p:cNvPr id="2" name="Title 1">
             <a:extLst>
               <a:ext uri="{FF2B5EF4-FFF2-40B4-BE49-F238E27FC236}">
+                <a16:creationId xmlns:a16="http://schemas.microsoft.com/office/drawing/2014/main" id="{1D425E9C-2F26-4B5C-8680-423D7F884168}"/>
+              </a:ext>
+            </a:extLst>
+          </p:cNvPr>
+          <p:cNvSpPr>
+            <a:spLocks noGrp="1"/>
+          </p:cNvSpPr>
+          <p:nvPr>
+            <p:ph type="title"/>
+          </p:nvPr>
+        </p:nvSpPr>
+        <p:spPr/>
+        <p:txBody>
+          <a:bodyPr/>
+          <a:lstStyle/>
+          <a:p>
+            <a:endParaRPr lang="en-US"/>
+          </a:p>
+        </p:txBody>
+      </p:sp>
+      <p:sp>
+        <p:nvSpPr>
+          <p:cNvPr id="3" name="Content Placeholder 2">
+            <a:extLst>
+              <a:ext uri="{FF2B5EF4-FFF2-40B4-BE49-F238E27FC236}">
+                <a16:creationId xmlns:a16="http://schemas.microsoft.com/office/drawing/2014/main" id="{4D4001AD-B4F2-4C3D-8E8E-8D280A761B91}"/>
+              </a:ext>
+            </a:extLst>
+          </p:cNvPr>
+          <p:cNvSpPr>
+            <a:spLocks noGrp="1"/>
+          </p:cNvSpPr>
+          <p:nvPr>
+            <p:ph idx="1"/>
+          </p:nvPr>
+        </p:nvSpPr>
+        <p:spPr/>
+        <p:txBody>
+          <a:bodyPr/>
+          <a:lstStyle/>
+          <a:p>
+            <a:endParaRPr lang="en-US"/>
+          </a:p>
+        </p:txBody>
+      </p:sp>
+      <p:graphicFrame>
+        <p:nvGraphicFramePr>
+          <p:cNvPr id="4" name="Chart 3">
+            <a:extLst>
+              <a:ext uri="{FF2B5EF4-FFF2-40B4-BE49-F238E27FC236}">
+                <a16:creationId xmlns:a16="http://schemas.microsoft.com/office/drawing/2014/main" id="{99B3E988-07A0-4EEC-B4DB-3B634631CC9B}"/>
+              </a:ext>
+            </a:extLst>
+          </p:cNvPr>
+          <p:cNvGraphicFramePr>
+            <a:graphicFrameLocks/>
+          </p:cNvGraphicFramePr>
+          <p:nvPr>
+            <p:extLst>
+              <p:ext uri="{D42A27DB-BD31-4B8C-83A1-F6EECF244321}">
+                <p14:modId xmlns:p14="http://schemas.microsoft.com/office/powerpoint/2010/main" val="1046404648"/>
+              </p:ext>
+            </p:extLst>
+          </p:nvPr>
+        </p:nvGraphicFramePr>
+        <p:xfrm>
+          <a:off x="0" y="0"/>
+          <a:ext cx="12192000" cy="6858000"/>
+        </p:xfrm>
+        <a:graphic>
+          <a:graphicData uri="http://schemas.openxmlformats.org/drawingml/2006/chart">
+            <c:chart xmlns:c="http://schemas.openxmlformats.org/drawingml/2006/chart" xmlns:r="http://schemas.openxmlformats.org/officeDocument/2006/relationships" r:id="rId2"/>
+          </a:graphicData>
+        </a:graphic>
+      </p:graphicFrame>
+    </p:spTree>
+    <p:extLst>
+      <p:ext uri="{BB962C8B-B14F-4D97-AF65-F5344CB8AC3E}">
+        <p14:creationId xmlns:p14="http://schemas.microsoft.com/office/powerpoint/2010/main" val="572555132"/>
+      </p:ext>
+    </p:extLst>
+  </p:cSld>
+  <p:clrMapOvr>
+    <a:masterClrMapping/>
+  </p:clrMapOvr>
+</p:sld>
+</file>
+
+<file path=ppt/slides/slide7.xml><?xml version="1.0" encoding="utf-8"?>
+<p:sld xmlns:a="http://schemas.openxmlformats.org/drawingml/2006/main" xmlns:r="http://schemas.openxmlformats.org/officeDocument/2006/relationships" xmlns:p="http://schemas.openxmlformats.org/presentationml/2006/main">
+  <p:cSld>
+    <p:spTree>
+      <p:nvGrpSpPr>
+        <p:cNvPr id="1" name=""/>
+        <p:cNvGrpSpPr/>
+        <p:nvPr/>
+      </p:nvGrpSpPr>
+      <p:grpSpPr>
+        <a:xfrm>
+          <a:off x="0" y="0"/>
+          <a:ext cx="0" cy="0"/>
+          <a:chOff x="0" y="0"/>
+          <a:chExt cx="0" cy="0"/>
+        </a:xfrm>
+      </p:grpSpPr>
+      <p:sp>
+        <p:nvSpPr>
+          <p:cNvPr id="2" name="Title 1">
+            <a:extLst>
+              <a:ext uri="{FF2B5EF4-FFF2-40B4-BE49-F238E27FC236}">
+                <a16:creationId xmlns:a16="http://schemas.microsoft.com/office/drawing/2014/main" id="{BA14E8EC-2811-47A2-8B55-A6E8CC6688D2}"/>
+              </a:ext>
+            </a:extLst>
+          </p:cNvPr>
+          <p:cNvSpPr>
+            <a:spLocks noGrp="1"/>
+          </p:cNvSpPr>
+          <p:nvPr>
+            <p:ph type="title"/>
+          </p:nvPr>
+        </p:nvSpPr>
+        <p:spPr/>
+        <p:txBody>
+          <a:bodyPr/>
+          <a:lstStyle/>
+          <a:p>
+            <a:endParaRPr lang="en-US"/>
+          </a:p>
+        </p:txBody>
+      </p:sp>
+      <p:sp>
+        <p:nvSpPr>
+          <p:cNvPr id="3" name="Content Placeholder 2">
+            <a:extLst>
+              <a:ext uri="{FF2B5EF4-FFF2-40B4-BE49-F238E27FC236}">
+                <a16:creationId xmlns:a16="http://schemas.microsoft.com/office/drawing/2014/main" id="{E0A3EC47-D917-4E43-88A3-491124AC251C}"/>
+              </a:ext>
+            </a:extLst>
+          </p:cNvPr>
+          <p:cNvSpPr>
+            <a:spLocks noGrp="1"/>
+          </p:cNvSpPr>
+          <p:nvPr>
+            <p:ph idx="1"/>
+          </p:nvPr>
+        </p:nvSpPr>
+        <p:spPr/>
+        <p:txBody>
+          <a:bodyPr/>
+          <a:lstStyle/>
+          <a:p>
+            <a:endParaRPr lang="en-US"/>
+          </a:p>
+        </p:txBody>
+      </p:sp>
+      <p:graphicFrame>
+        <p:nvGraphicFramePr>
+          <p:cNvPr id="4" name="Chart 3">
+            <a:extLst>
+              <a:ext uri="{FF2B5EF4-FFF2-40B4-BE49-F238E27FC236}">
+                <a16:creationId xmlns:a16="http://schemas.microsoft.com/office/drawing/2014/main" id="{0E03DFDC-C9F9-46E8-A98C-3BF5F43FD393}"/>
+              </a:ext>
+            </a:extLst>
+          </p:cNvPr>
+          <p:cNvGraphicFramePr>
+            <a:graphicFrameLocks/>
+          </p:cNvGraphicFramePr>
+          <p:nvPr>
+            <p:extLst>
+              <p:ext uri="{D42A27DB-BD31-4B8C-83A1-F6EECF244321}">
+                <p14:modId xmlns:p14="http://schemas.microsoft.com/office/powerpoint/2010/main" val="2036448223"/>
+              </p:ext>
+            </p:extLst>
+          </p:nvPr>
+        </p:nvGraphicFramePr>
+        <p:xfrm>
+          <a:off x="0" y="0"/>
+          <a:ext cx="12192000" cy="6858000"/>
+        </p:xfrm>
+        <a:graphic>
+          <a:graphicData uri="http://schemas.openxmlformats.org/drawingml/2006/chart">
+            <c:chart xmlns:c="http://schemas.openxmlformats.org/drawingml/2006/chart" xmlns:r="http://schemas.openxmlformats.org/officeDocument/2006/relationships" r:id="rId2"/>
+          </a:graphicData>
+        </a:graphic>
+      </p:graphicFrame>
+    </p:spTree>
+    <p:extLst>
+      <p:ext uri="{BB962C8B-B14F-4D97-AF65-F5344CB8AC3E}">
+        <p14:creationId xmlns:p14="http://schemas.microsoft.com/office/powerpoint/2010/main" val="819506335"/>
+      </p:ext>
+    </p:extLst>
+  </p:cSld>
+  <p:clrMapOvr>
+    <a:masterClrMapping/>
+  </p:clrMapOvr>
+</p:sld>
+</file>
+
+<file path=ppt/slides/slide8.xml><?xml version="1.0" encoding="utf-8"?>
+<p:sld xmlns:a="http://schemas.openxmlformats.org/drawingml/2006/main" xmlns:r="http://schemas.openxmlformats.org/officeDocument/2006/relationships" xmlns:p="http://schemas.openxmlformats.org/presentationml/2006/main">
+  <p:cSld>
+    <p:spTree>
+      <p:nvGrpSpPr>
+        <p:cNvPr id="1" name=""/>
+        <p:cNvGrpSpPr/>
+        <p:nvPr/>
+      </p:nvGrpSpPr>
+      <p:grpSpPr>
+        <a:xfrm>
+          <a:off x="0" y="0"/>
+          <a:ext cx="0" cy="0"/>
+          <a:chOff x="0" y="0"/>
+          <a:chExt cx="0" cy="0"/>
+        </a:xfrm>
+      </p:grpSpPr>
+      <p:sp>
+        <p:nvSpPr>
+          <p:cNvPr id="2" name="Title 1">
+            <a:extLst>
+              <a:ext uri="{FF2B5EF4-FFF2-40B4-BE49-F238E27FC236}">
                 <a16:creationId xmlns:a16="http://schemas.microsoft.com/office/drawing/2014/main" id="{A9E76E52-854F-4B65-8FE0-5B11311D1F2D}"/>
               </a:ext>
             </a:extLst>
@@ -13549,7 +13731,7 @@
 </p:sld>
 </file>
 
-<file path=ppt/slides/slide7.xml><?xml version="1.0" encoding="utf-8"?>
+<file path=ppt/slides/slide9.xml><?xml version="1.0" encoding="utf-8"?>
 <p:sld xmlns:a="http://schemas.openxmlformats.org/drawingml/2006/main" xmlns:r="http://schemas.openxmlformats.org/officeDocument/2006/relationships" xmlns:p="http://schemas.openxmlformats.org/presentationml/2006/main">
   <p:cSld>
     <p:spTree>
@@ -13650,226 +13832,6 @@
     <p:extLst>
       <p:ext uri="{BB962C8B-B14F-4D97-AF65-F5344CB8AC3E}">
         <p14:creationId xmlns:p14="http://schemas.microsoft.com/office/powerpoint/2010/main" val="3522754069"/>
-      </p:ext>
-    </p:extLst>
-  </p:cSld>
-  <p:clrMapOvr>
-    <a:masterClrMapping/>
-  </p:clrMapOvr>
-</p:sld>
-</file>
-
-<file path=ppt/slides/slide8.xml><?xml version="1.0" encoding="utf-8"?>
-<p:sld xmlns:a="http://schemas.openxmlformats.org/drawingml/2006/main" xmlns:r="http://schemas.openxmlformats.org/officeDocument/2006/relationships" xmlns:p="http://schemas.openxmlformats.org/presentationml/2006/main">
-  <p:cSld>
-    <p:spTree>
-      <p:nvGrpSpPr>
-        <p:cNvPr id="1" name=""/>
-        <p:cNvGrpSpPr/>
-        <p:nvPr/>
-      </p:nvGrpSpPr>
-      <p:grpSpPr>
-        <a:xfrm>
-          <a:off x="0" y="0"/>
-          <a:ext cx="0" cy="0"/>
-          <a:chOff x="0" y="0"/>
-          <a:chExt cx="0" cy="0"/>
-        </a:xfrm>
-      </p:grpSpPr>
-      <p:sp>
-        <p:nvSpPr>
-          <p:cNvPr id="2" name="Title 1">
-            <a:extLst>
-              <a:ext uri="{FF2B5EF4-FFF2-40B4-BE49-F238E27FC236}">
-                <a16:creationId xmlns:a16="http://schemas.microsoft.com/office/drawing/2014/main" id="{1D425E9C-2F26-4B5C-8680-423D7F884168}"/>
-              </a:ext>
-            </a:extLst>
-          </p:cNvPr>
-          <p:cNvSpPr>
-            <a:spLocks noGrp="1"/>
-          </p:cNvSpPr>
-          <p:nvPr>
-            <p:ph type="title"/>
-          </p:nvPr>
-        </p:nvSpPr>
-        <p:spPr/>
-        <p:txBody>
-          <a:bodyPr/>
-          <a:lstStyle/>
-          <a:p>
-            <a:endParaRPr lang="en-US"/>
-          </a:p>
-        </p:txBody>
-      </p:sp>
-      <p:sp>
-        <p:nvSpPr>
-          <p:cNvPr id="3" name="Content Placeholder 2">
-            <a:extLst>
-              <a:ext uri="{FF2B5EF4-FFF2-40B4-BE49-F238E27FC236}">
-                <a16:creationId xmlns:a16="http://schemas.microsoft.com/office/drawing/2014/main" id="{4D4001AD-B4F2-4C3D-8E8E-8D280A761B91}"/>
-              </a:ext>
-            </a:extLst>
-          </p:cNvPr>
-          <p:cNvSpPr>
-            <a:spLocks noGrp="1"/>
-          </p:cNvSpPr>
-          <p:nvPr>
-            <p:ph idx="1"/>
-          </p:nvPr>
-        </p:nvSpPr>
-        <p:spPr/>
-        <p:txBody>
-          <a:bodyPr/>
-          <a:lstStyle/>
-          <a:p>
-            <a:endParaRPr lang="en-US"/>
-          </a:p>
-        </p:txBody>
-      </p:sp>
-      <p:graphicFrame>
-        <p:nvGraphicFramePr>
-          <p:cNvPr id="4" name="Chart 3">
-            <a:extLst>
-              <a:ext uri="{FF2B5EF4-FFF2-40B4-BE49-F238E27FC236}">
-                <a16:creationId xmlns:a16="http://schemas.microsoft.com/office/drawing/2014/main" id="{99B3E988-07A0-4EEC-B4DB-3B634631CC9B}"/>
-              </a:ext>
-            </a:extLst>
-          </p:cNvPr>
-          <p:cNvGraphicFramePr>
-            <a:graphicFrameLocks/>
-          </p:cNvGraphicFramePr>
-          <p:nvPr>
-            <p:extLst>
-              <p:ext uri="{D42A27DB-BD31-4B8C-83A1-F6EECF244321}">
-                <p14:modId xmlns:p14="http://schemas.microsoft.com/office/powerpoint/2010/main" val="1046404648"/>
-              </p:ext>
-            </p:extLst>
-          </p:nvPr>
-        </p:nvGraphicFramePr>
-        <p:xfrm>
-          <a:off x="0" y="0"/>
-          <a:ext cx="12192000" cy="6858000"/>
-        </p:xfrm>
-        <a:graphic>
-          <a:graphicData uri="http://schemas.openxmlformats.org/drawingml/2006/chart">
-            <c:chart xmlns:c="http://schemas.openxmlformats.org/drawingml/2006/chart" xmlns:r="http://schemas.openxmlformats.org/officeDocument/2006/relationships" r:id="rId2"/>
-          </a:graphicData>
-        </a:graphic>
-      </p:graphicFrame>
-    </p:spTree>
-    <p:extLst>
-      <p:ext uri="{BB962C8B-B14F-4D97-AF65-F5344CB8AC3E}">
-        <p14:creationId xmlns:p14="http://schemas.microsoft.com/office/powerpoint/2010/main" val="572555132"/>
-      </p:ext>
-    </p:extLst>
-  </p:cSld>
-  <p:clrMapOvr>
-    <a:masterClrMapping/>
-  </p:clrMapOvr>
-</p:sld>
-</file>
-
-<file path=ppt/slides/slide9.xml><?xml version="1.0" encoding="utf-8"?>
-<p:sld xmlns:a="http://schemas.openxmlformats.org/drawingml/2006/main" xmlns:r="http://schemas.openxmlformats.org/officeDocument/2006/relationships" xmlns:p="http://schemas.openxmlformats.org/presentationml/2006/main">
-  <p:cSld>
-    <p:spTree>
-      <p:nvGrpSpPr>
-        <p:cNvPr id="1" name=""/>
-        <p:cNvGrpSpPr/>
-        <p:nvPr/>
-      </p:nvGrpSpPr>
-      <p:grpSpPr>
-        <a:xfrm>
-          <a:off x="0" y="0"/>
-          <a:ext cx="0" cy="0"/>
-          <a:chOff x="0" y="0"/>
-          <a:chExt cx="0" cy="0"/>
-        </a:xfrm>
-      </p:grpSpPr>
-      <p:sp>
-        <p:nvSpPr>
-          <p:cNvPr id="2" name="Title 1">
-            <a:extLst>
-              <a:ext uri="{FF2B5EF4-FFF2-40B4-BE49-F238E27FC236}">
-                <a16:creationId xmlns:a16="http://schemas.microsoft.com/office/drawing/2014/main" id="{BA14E8EC-2811-47A2-8B55-A6E8CC6688D2}"/>
-              </a:ext>
-            </a:extLst>
-          </p:cNvPr>
-          <p:cNvSpPr>
-            <a:spLocks noGrp="1"/>
-          </p:cNvSpPr>
-          <p:nvPr>
-            <p:ph type="title"/>
-          </p:nvPr>
-        </p:nvSpPr>
-        <p:spPr/>
-        <p:txBody>
-          <a:bodyPr/>
-          <a:lstStyle/>
-          <a:p>
-            <a:endParaRPr lang="en-US"/>
-          </a:p>
-        </p:txBody>
-      </p:sp>
-      <p:sp>
-        <p:nvSpPr>
-          <p:cNvPr id="3" name="Content Placeholder 2">
-            <a:extLst>
-              <a:ext uri="{FF2B5EF4-FFF2-40B4-BE49-F238E27FC236}">
-                <a16:creationId xmlns:a16="http://schemas.microsoft.com/office/drawing/2014/main" id="{E0A3EC47-D917-4E43-88A3-491124AC251C}"/>
-              </a:ext>
-            </a:extLst>
-          </p:cNvPr>
-          <p:cNvSpPr>
-            <a:spLocks noGrp="1"/>
-          </p:cNvSpPr>
-          <p:nvPr>
-            <p:ph idx="1"/>
-          </p:nvPr>
-        </p:nvSpPr>
-        <p:spPr/>
-        <p:txBody>
-          <a:bodyPr/>
-          <a:lstStyle/>
-          <a:p>
-            <a:endParaRPr lang="en-US"/>
-          </a:p>
-        </p:txBody>
-      </p:sp>
-      <p:graphicFrame>
-        <p:nvGraphicFramePr>
-          <p:cNvPr id="4" name="Chart 3">
-            <a:extLst>
-              <a:ext uri="{FF2B5EF4-FFF2-40B4-BE49-F238E27FC236}">
-                <a16:creationId xmlns:a16="http://schemas.microsoft.com/office/drawing/2014/main" id="{0E03DFDC-C9F9-46E8-A98C-3BF5F43FD393}"/>
-              </a:ext>
-            </a:extLst>
-          </p:cNvPr>
-          <p:cNvGraphicFramePr>
-            <a:graphicFrameLocks/>
-          </p:cNvGraphicFramePr>
-          <p:nvPr>
-            <p:extLst>
-              <p:ext uri="{D42A27DB-BD31-4B8C-83A1-F6EECF244321}">
-                <p14:modId xmlns:p14="http://schemas.microsoft.com/office/powerpoint/2010/main" val="2036448223"/>
-              </p:ext>
-            </p:extLst>
-          </p:nvPr>
-        </p:nvGraphicFramePr>
-        <p:xfrm>
-          <a:off x="0" y="0"/>
-          <a:ext cx="12192000" cy="6858000"/>
-        </p:xfrm>
-        <a:graphic>
-          <a:graphicData uri="http://schemas.openxmlformats.org/drawingml/2006/chart">
-            <c:chart xmlns:c="http://schemas.openxmlformats.org/drawingml/2006/chart" xmlns:r="http://schemas.openxmlformats.org/officeDocument/2006/relationships" r:id="rId2"/>
-          </a:graphicData>
-        </a:graphic>
-      </p:graphicFrame>
-    </p:spTree>
-    <p:extLst>
-      <p:ext uri="{BB962C8B-B14F-4D97-AF65-F5344CB8AC3E}">
-        <p14:creationId xmlns:p14="http://schemas.microsoft.com/office/powerpoint/2010/main" val="819506335"/>
       </p:ext>
     </p:extLst>
   </p:cSld>

</xml_diff>